<commit_message>
initial commit for PHP Process Data project
</commit_message>
<xml_diff>
--- a/PHP_Process_Data_From_MySQL/beam_analysis/beam_analysis.pptx
+++ b/PHP_Process_Data_From_MySQL/beam_analysis/beam_analysis.pptx
@@ -19,6 +19,7 @@
     <p:sldId id="270" r:id="rId13"/>
     <p:sldId id="271" r:id="rId14"/>
     <p:sldId id="272" r:id="rId15"/>
+    <p:sldId id="273" r:id="rId16"/>
   </p:sldIdLst>
   <p:sldSz cx="9144000" cy="6858000" type="screen4x3"/>
   <p:notesSz cx="6858000" cy="9144000"/>
@@ -302,7 +303,7 @@
             <a:fld id="{1D8BD707-D9CF-40AE-B4C6-C98DA3205C09}" type="datetimeFigureOut">
               <a:rPr lang="en-US" smtClean="0"/>
               <a:pPr/>
-              <a:t>1/9/2016</a:t>
+              <a:t>1/11/2016</a:t>
             </a:fld>
             <a:endParaRPr lang="en-US"/>
           </a:p>
@@ -469,7 +470,7 @@
             <a:fld id="{1D8BD707-D9CF-40AE-B4C6-C98DA3205C09}" type="datetimeFigureOut">
               <a:rPr lang="en-US" smtClean="0"/>
               <a:pPr/>
-              <a:t>1/9/2016</a:t>
+              <a:t>1/11/2016</a:t>
             </a:fld>
             <a:endParaRPr lang="en-US"/>
           </a:p>
@@ -646,7 +647,7 @@
             <a:fld id="{1D8BD707-D9CF-40AE-B4C6-C98DA3205C09}" type="datetimeFigureOut">
               <a:rPr lang="en-US" smtClean="0"/>
               <a:pPr/>
-              <a:t>1/9/2016</a:t>
+              <a:t>1/11/2016</a:t>
             </a:fld>
             <a:endParaRPr lang="en-US"/>
           </a:p>
@@ -813,7 +814,7 @@
             <a:fld id="{1D8BD707-D9CF-40AE-B4C6-C98DA3205C09}" type="datetimeFigureOut">
               <a:rPr lang="en-US" smtClean="0"/>
               <a:pPr/>
-              <a:t>1/9/2016</a:t>
+              <a:t>1/11/2016</a:t>
             </a:fld>
             <a:endParaRPr lang="en-US"/>
           </a:p>
@@ -1056,7 +1057,7 @@
             <a:fld id="{1D8BD707-D9CF-40AE-B4C6-C98DA3205C09}" type="datetimeFigureOut">
               <a:rPr lang="en-US" smtClean="0"/>
               <a:pPr/>
-              <a:t>1/9/2016</a:t>
+              <a:t>1/11/2016</a:t>
             </a:fld>
             <a:endParaRPr lang="en-US"/>
           </a:p>
@@ -1341,7 +1342,7 @@
             <a:fld id="{1D8BD707-D9CF-40AE-B4C6-C98DA3205C09}" type="datetimeFigureOut">
               <a:rPr lang="en-US" smtClean="0"/>
               <a:pPr/>
-              <a:t>1/9/2016</a:t>
+              <a:t>1/11/2016</a:t>
             </a:fld>
             <a:endParaRPr lang="en-US"/>
           </a:p>
@@ -1760,7 +1761,7 @@
             <a:fld id="{1D8BD707-D9CF-40AE-B4C6-C98DA3205C09}" type="datetimeFigureOut">
               <a:rPr lang="en-US" smtClean="0"/>
               <a:pPr/>
-              <a:t>1/9/2016</a:t>
+              <a:t>1/11/2016</a:t>
             </a:fld>
             <a:endParaRPr lang="en-US"/>
           </a:p>
@@ -1875,7 +1876,7 @@
             <a:fld id="{1D8BD707-D9CF-40AE-B4C6-C98DA3205C09}" type="datetimeFigureOut">
               <a:rPr lang="en-US" smtClean="0"/>
               <a:pPr/>
-              <a:t>1/9/2016</a:t>
+              <a:t>1/11/2016</a:t>
             </a:fld>
             <a:endParaRPr lang="en-US"/>
           </a:p>
@@ -1967,7 +1968,7 @@
             <a:fld id="{1D8BD707-D9CF-40AE-B4C6-C98DA3205C09}" type="datetimeFigureOut">
               <a:rPr lang="en-US" smtClean="0"/>
               <a:pPr/>
-              <a:t>1/9/2016</a:t>
+              <a:t>1/11/2016</a:t>
             </a:fld>
             <a:endParaRPr lang="en-US"/>
           </a:p>
@@ -2241,7 +2242,7 @@
             <a:fld id="{1D8BD707-D9CF-40AE-B4C6-C98DA3205C09}" type="datetimeFigureOut">
               <a:rPr lang="en-US" smtClean="0"/>
               <a:pPr/>
-              <a:t>1/9/2016</a:t>
+              <a:t>1/11/2016</a:t>
             </a:fld>
             <a:endParaRPr lang="en-US"/>
           </a:p>
@@ -2491,7 +2492,7 @@
             <a:fld id="{1D8BD707-D9CF-40AE-B4C6-C98DA3205C09}" type="datetimeFigureOut">
               <a:rPr lang="en-US" smtClean="0"/>
               <a:pPr/>
-              <a:t>1/9/2016</a:t>
+              <a:t>1/11/2016</a:t>
             </a:fld>
             <a:endParaRPr lang="en-US"/>
           </a:p>
@@ -2701,7 +2702,7 @@
             <a:fld id="{1D8BD707-D9CF-40AE-B4C6-C98DA3205C09}" type="datetimeFigureOut">
               <a:rPr lang="en-US" smtClean="0"/>
               <a:pPr/>
-              <a:t>1/9/2016</a:t>
+              <a:t>1/11/2016</a:t>
             </a:fld>
             <a:endParaRPr lang="en-US"/>
           </a:p>
@@ -6995,6 +6996,134 @@
           </a:p>
         </p:txBody>
       </p:sp>
+      <p:sp>
+        <p:nvSpPr>
+          <p:cNvPr id="50" name="Oval 49"/>
+          <p:cNvSpPr/>
+          <p:nvPr/>
+        </p:nvSpPr>
+        <p:spPr>
+          <a:xfrm>
+            <a:off x="982287" y="2506287"/>
+            <a:ext cx="152400" cy="152400"/>
+          </a:xfrm>
+          <a:prstGeom prst="ellipse">
+            <a:avLst/>
+          </a:prstGeom>
+          <a:noFill/>
+          <a:ln>
+            <a:solidFill>
+              <a:srgbClr val="FF0000"/>
+            </a:solidFill>
+          </a:ln>
+        </p:spPr>
+        <p:style>
+          <a:lnRef idx="2">
+            <a:schemeClr val="accent1">
+              <a:shade val="50000"/>
+            </a:schemeClr>
+          </a:lnRef>
+          <a:fillRef idx="1">
+            <a:schemeClr val="accent1"/>
+          </a:fillRef>
+          <a:effectRef idx="0">
+            <a:schemeClr val="accent1"/>
+          </a:effectRef>
+          <a:fontRef idx="minor">
+            <a:schemeClr val="lt1"/>
+          </a:fontRef>
+        </p:style>
+        <p:txBody>
+          <a:bodyPr rtlCol="0" anchor="ctr"/>
+          <a:lstStyle/>
+          <a:p>
+            <a:pPr algn="ctr"/>
+            <a:endParaRPr lang="en-US"/>
+          </a:p>
+        </p:txBody>
+      </p:sp>
+      <p:cxnSp>
+        <p:nvCxnSpPr>
+          <p:cNvPr id="52" name="Straight Arrow Connector 51"/>
+          <p:cNvCxnSpPr/>
+          <p:nvPr/>
+        </p:nvCxnSpPr>
+        <p:spPr>
+          <a:xfrm>
+            <a:off x="3429000" y="1752600"/>
+            <a:ext cx="0" cy="838200"/>
+          </a:xfrm>
+          <a:prstGeom prst="straightConnector1">
+            <a:avLst/>
+          </a:prstGeom>
+          <a:ln w="38100">
+            <a:solidFill>
+              <a:srgbClr val="FF0000"/>
+            </a:solidFill>
+            <a:tailEnd type="triangle" w="med" len="sm"/>
+          </a:ln>
+        </p:spPr>
+        <p:style>
+          <a:lnRef idx="1">
+            <a:schemeClr val="accent1"/>
+          </a:lnRef>
+          <a:fillRef idx="0">
+            <a:schemeClr val="accent1"/>
+          </a:fillRef>
+          <a:effectRef idx="0">
+            <a:schemeClr val="accent1"/>
+          </a:effectRef>
+          <a:fontRef idx="minor">
+            <a:schemeClr val="tx1"/>
+          </a:fontRef>
+        </p:style>
+      </p:cxnSp>
+      <p:sp>
+        <p:nvSpPr>
+          <p:cNvPr id="54" name="Oval 53"/>
+          <p:cNvSpPr/>
+          <p:nvPr/>
+        </p:nvSpPr>
+        <p:spPr>
+          <a:xfrm>
+            <a:off x="3352800" y="2514600"/>
+            <a:ext cx="152400" cy="152400"/>
+          </a:xfrm>
+          <a:prstGeom prst="ellipse">
+            <a:avLst/>
+          </a:prstGeom>
+          <a:noFill/>
+          <a:ln>
+            <a:solidFill>
+              <a:srgbClr val="FF0000"/>
+            </a:solidFill>
+          </a:ln>
+        </p:spPr>
+        <p:style>
+          <a:lnRef idx="2">
+            <a:schemeClr val="accent1">
+              <a:shade val="50000"/>
+            </a:schemeClr>
+          </a:lnRef>
+          <a:fillRef idx="1">
+            <a:schemeClr val="accent1"/>
+          </a:fillRef>
+          <a:effectRef idx="0">
+            <a:schemeClr val="accent1"/>
+          </a:effectRef>
+          <a:fontRef idx="minor">
+            <a:schemeClr val="lt1"/>
+          </a:fontRef>
+        </p:style>
+        <p:txBody>
+          <a:bodyPr rtlCol="0" anchor="ctr"/>
+          <a:lstStyle/>
+          <a:p>
+            <a:pPr algn="ctr"/>
+            <a:endParaRPr lang="en-US"/>
+          </a:p>
+        </p:txBody>
+      </p:sp>
     </p:spTree>
   </p:cSld>
   <p:clrMapOvr>
@@ -8269,8 +8398,8 @@
         </p:nvSpPr>
         <p:spPr>
           <a:xfrm>
-            <a:off x="381000" y="1447800"/>
-            <a:ext cx="8458200" cy="3970318"/>
+            <a:off x="381000" y="457200"/>
+            <a:ext cx="8458200" cy="4247317"/>
           </a:xfrm>
           <a:prstGeom prst="rect">
             <a:avLst/>
@@ -8305,7 +8434,7 @@
             </a:pPr>
             <a:r>
               <a:rPr lang="en-US" dirty="0" smtClean="0"/>
-              <a:t>Beside all HARD NODES given in the db tables, need to loop through all distributed loading: Distributed Force/Moment by checking if it has opposite signs at start and end.</a:t>
+              <a:t>Beside all HARD NODES explicitly defined in the db tables, need to loop through all distributed loading: Distributed Force/Moment by checking if it has opposite signs at start and end.</a:t>
             </a:r>
           </a:p>
           <a:p>
@@ -8315,7 +8444,7 @@
             </a:pPr>
             <a:r>
               <a:rPr lang="en-US" dirty="0" smtClean="0"/>
-              <a:t>Loop through all elements, determine the length of each element, </a:t>
+              <a:t>Loop through all elements defined by HARD NODES, determine the length of each element, </a:t>
             </a:r>
           </a:p>
           <a:p>
@@ -8397,6 +8526,1333 @@
             <a:r>
               <a:rPr lang="en-US" dirty="0" smtClean="0"/>
               <a:t> (MY - moment) of all nodes from start to end.</a:t>
+            </a:r>
+            <a:endParaRPr lang="en-US" dirty="0"/>
+          </a:p>
+        </p:txBody>
+      </p:sp>
+    </p:spTree>
+  </p:cSld>
+  <p:clrMapOvr>
+    <a:masterClrMapping/>
+  </p:clrMapOvr>
+</p:sld>
+</file>
+
+<file path=ppt/slides/slide15.xml><?xml version="1.0" encoding="utf-8"?>
+<p:sld xmlns:a="http://schemas.openxmlformats.org/drawingml/2006/main" xmlns:r="http://schemas.openxmlformats.org/officeDocument/2006/relationships" xmlns:p="http://schemas.openxmlformats.org/presentationml/2006/main">
+  <p:cSld>
+    <p:spTree>
+      <p:nvGrpSpPr>
+        <p:cNvPr id="1" name=""/>
+        <p:cNvGrpSpPr/>
+        <p:nvPr/>
+      </p:nvGrpSpPr>
+      <p:grpSpPr>
+        <a:xfrm>
+          <a:off x="0" y="0"/>
+          <a:ext cx="0" cy="0"/>
+          <a:chOff x="0" y="0"/>
+          <a:chExt cx="0" cy="0"/>
+        </a:xfrm>
+      </p:grpSpPr>
+      <p:pic>
+        <p:nvPicPr>
+          <p:cNvPr id="4" name="Picture 2" descr="C:\Users\Jack\Desktop\Noname.png"/>
+          <p:cNvPicPr>
+            <a:picLocks noChangeAspect="1" noChangeArrowheads="1"/>
+          </p:cNvPicPr>
+          <p:nvPr/>
+        </p:nvPicPr>
+        <p:blipFill>
+          <a:blip r:embed="rId2" cstate="print"/>
+          <a:srcRect l="30000" t="12463" r="52500" b="66806"/>
+          <a:stretch>
+            <a:fillRect/>
+          </a:stretch>
+        </p:blipFill>
+        <p:spPr bwMode="auto">
+          <a:xfrm>
+            <a:off x="1828800" y="228600"/>
+            <a:ext cx="4953000" cy="3200400"/>
+          </a:xfrm>
+          <a:prstGeom prst="rect">
+            <a:avLst/>
+          </a:prstGeom>
+          <a:noFill/>
+        </p:spPr>
+      </p:pic>
+      <p:cxnSp>
+        <p:nvCxnSpPr>
+          <p:cNvPr id="6" name="Straight Arrow Connector 5"/>
+          <p:cNvCxnSpPr/>
+          <p:nvPr/>
+        </p:nvCxnSpPr>
+        <p:spPr>
+          <a:xfrm>
+            <a:off x="5257800" y="838200"/>
+            <a:ext cx="0" cy="1600200"/>
+          </a:xfrm>
+          <a:prstGeom prst="straightConnector1">
+            <a:avLst/>
+          </a:prstGeom>
+          <a:ln w="25400">
+            <a:solidFill>
+              <a:schemeClr val="tx1"/>
+            </a:solidFill>
+            <a:tailEnd type="triangle"/>
+          </a:ln>
+        </p:spPr>
+        <p:style>
+          <a:lnRef idx="1">
+            <a:schemeClr val="accent1"/>
+          </a:lnRef>
+          <a:fillRef idx="0">
+            <a:schemeClr val="accent1"/>
+          </a:fillRef>
+          <a:effectRef idx="0">
+            <a:schemeClr val="accent1"/>
+          </a:effectRef>
+          <a:fontRef idx="minor">
+            <a:schemeClr val="tx1"/>
+          </a:fontRef>
+        </p:style>
+      </p:cxnSp>
+      <p:cxnSp>
+        <p:nvCxnSpPr>
+          <p:cNvPr id="8" name="Straight Arrow Connector 7"/>
+          <p:cNvCxnSpPr/>
+          <p:nvPr/>
+        </p:nvCxnSpPr>
+        <p:spPr>
+          <a:xfrm>
+            <a:off x="3962400" y="838200"/>
+            <a:ext cx="0" cy="1905000"/>
+          </a:xfrm>
+          <a:prstGeom prst="straightConnector1">
+            <a:avLst/>
+          </a:prstGeom>
+          <a:ln w="25400">
+            <a:solidFill>
+              <a:schemeClr val="tx1"/>
+            </a:solidFill>
+            <a:tailEnd type="triangle"/>
+          </a:ln>
+        </p:spPr>
+        <p:style>
+          <a:lnRef idx="1">
+            <a:schemeClr val="accent1"/>
+          </a:lnRef>
+          <a:fillRef idx="0">
+            <a:schemeClr val="accent1"/>
+          </a:fillRef>
+          <a:effectRef idx="0">
+            <a:schemeClr val="accent1"/>
+          </a:effectRef>
+          <a:fontRef idx="minor">
+            <a:schemeClr val="tx1"/>
+          </a:fontRef>
+        </p:style>
+      </p:cxnSp>
+      <p:cxnSp>
+        <p:nvCxnSpPr>
+          <p:cNvPr id="10" name="Straight Arrow Connector 9"/>
+          <p:cNvCxnSpPr/>
+          <p:nvPr/>
+        </p:nvCxnSpPr>
+        <p:spPr>
+          <a:xfrm>
+            <a:off x="2743200" y="1905000"/>
+            <a:ext cx="1143000" cy="0"/>
+          </a:xfrm>
+          <a:prstGeom prst="straightConnector1">
+            <a:avLst/>
+          </a:prstGeom>
+          <a:ln w="25400">
+            <a:solidFill>
+              <a:schemeClr val="tx1"/>
+            </a:solidFill>
+            <a:headEnd type="triangle"/>
+            <a:tailEnd type="triangle"/>
+          </a:ln>
+        </p:spPr>
+        <p:style>
+          <a:lnRef idx="1">
+            <a:schemeClr val="accent1"/>
+          </a:lnRef>
+          <a:fillRef idx="0">
+            <a:schemeClr val="accent1"/>
+          </a:fillRef>
+          <a:effectRef idx="0">
+            <a:schemeClr val="accent1"/>
+          </a:effectRef>
+          <a:fontRef idx="minor">
+            <a:schemeClr val="tx1"/>
+          </a:fontRef>
+        </p:style>
+      </p:cxnSp>
+      <p:cxnSp>
+        <p:nvCxnSpPr>
+          <p:cNvPr id="11" name="Straight Arrow Connector 10"/>
+          <p:cNvCxnSpPr/>
+          <p:nvPr/>
+        </p:nvCxnSpPr>
+        <p:spPr>
+          <a:xfrm>
+            <a:off x="4038600" y="1905000"/>
+            <a:ext cx="1143000" cy="0"/>
+          </a:xfrm>
+          <a:prstGeom prst="straightConnector1">
+            <a:avLst/>
+          </a:prstGeom>
+          <a:ln w="25400">
+            <a:solidFill>
+              <a:schemeClr val="tx1"/>
+            </a:solidFill>
+            <a:headEnd type="triangle"/>
+            <a:tailEnd type="triangle"/>
+          </a:ln>
+        </p:spPr>
+        <p:style>
+          <a:lnRef idx="1">
+            <a:schemeClr val="accent1"/>
+          </a:lnRef>
+          <a:fillRef idx="0">
+            <a:schemeClr val="accent1"/>
+          </a:fillRef>
+          <a:effectRef idx="0">
+            <a:schemeClr val="accent1"/>
+          </a:effectRef>
+          <a:fontRef idx="minor">
+            <a:schemeClr val="tx1"/>
+          </a:fontRef>
+        </p:style>
+      </p:cxnSp>
+      <p:sp>
+        <p:nvSpPr>
+          <p:cNvPr id="12" name="Oval 11"/>
+          <p:cNvSpPr>
+            <a:spLocks noChangeAspect="1"/>
+          </p:cNvSpPr>
+          <p:nvPr/>
+        </p:nvSpPr>
+        <p:spPr>
+          <a:xfrm>
+            <a:off x="2430087" y="652548"/>
+            <a:ext cx="381000" cy="381000"/>
+          </a:xfrm>
+          <a:prstGeom prst="ellipse">
+            <a:avLst/>
+          </a:prstGeom>
+          <a:noFill/>
+          <a:ln>
+            <a:solidFill>
+              <a:srgbClr val="FF0000"/>
+            </a:solidFill>
+          </a:ln>
+        </p:spPr>
+        <p:style>
+          <a:lnRef idx="2">
+            <a:schemeClr val="accent1">
+              <a:shade val="50000"/>
+            </a:schemeClr>
+          </a:lnRef>
+          <a:fillRef idx="1">
+            <a:schemeClr val="accent1"/>
+          </a:fillRef>
+          <a:effectRef idx="0">
+            <a:schemeClr val="accent1"/>
+          </a:effectRef>
+          <a:fontRef idx="minor">
+            <a:schemeClr val="lt1"/>
+          </a:fontRef>
+        </p:style>
+        <p:txBody>
+          <a:bodyPr rtlCol="0" anchor="ctr"/>
+          <a:lstStyle/>
+          <a:p>
+            <a:pPr algn="ctr"/>
+            <a:endParaRPr lang="en-US"/>
+          </a:p>
+        </p:txBody>
+      </p:sp>
+      <p:sp>
+        <p:nvSpPr>
+          <p:cNvPr id="13" name="Oval 12"/>
+          <p:cNvSpPr>
+            <a:spLocks noChangeAspect="1"/>
+          </p:cNvSpPr>
+          <p:nvPr/>
+        </p:nvSpPr>
+        <p:spPr>
+          <a:xfrm>
+            <a:off x="3785061" y="660861"/>
+            <a:ext cx="381000" cy="381000"/>
+          </a:xfrm>
+          <a:prstGeom prst="ellipse">
+            <a:avLst/>
+          </a:prstGeom>
+          <a:noFill/>
+          <a:ln>
+            <a:solidFill>
+              <a:srgbClr val="FF0000"/>
+            </a:solidFill>
+          </a:ln>
+        </p:spPr>
+        <p:style>
+          <a:lnRef idx="2">
+            <a:schemeClr val="accent1">
+              <a:shade val="50000"/>
+            </a:schemeClr>
+          </a:lnRef>
+          <a:fillRef idx="1">
+            <a:schemeClr val="accent1"/>
+          </a:fillRef>
+          <a:effectRef idx="0">
+            <a:schemeClr val="accent1"/>
+          </a:effectRef>
+          <a:fontRef idx="minor">
+            <a:schemeClr val="lt1"/>
+          </a:fontRef>
+        </p:style>
+        <p:txBody>
+          <a:bodyPr rtlCol="0" anchor="ctr"/>
+          <a:lstStyle/>
+          <a:p>
+            <a:pPr algn="ctr"/>
+            <a:endParaRPr lang="en-US"/>
+          </a:p>
+        </p:txBody>
+      </p:sp>
+      <p:sp>
+        <p:nvSpPr>
+          <p:cNvPr id="14" name="Oval 13"/>
+          <p:cNvSpPr>
+            <a:spLocks noChangeAspect="1"/>
+          </p:cNvSpPr>
+          <p:nvPr/>
+        </p:nvSpPr>
+        <p:spPr>
+          <a:xfrm>
+            <a:off x="5080461" y="660861"/>
+            <a:ext cx="381000" cy="381000"/>
+          </a:xfrm>
+          <a:prstGeom prst="ellipse">
+            <a:avLst/>
+          </a:prstGeom>
+          <a:noFill/>
+          <a:ln>
+            <a:solidFill>
+              <a:srgbClr val="FF0000"/>
+            </a:solidFill>
+          </a:ln>
+        </p:spPr>
+        <p:style>
+          <a:lnRef idx="2">
+            <a:schemeClr val="accent1">
+              <a:shade val="50000"/>
+            </a:schemeClr>
+          </a:lnRef>
+          <a:fillRef idx="1">
+            <a:schemeClr val="accent1"/>
+          </a:fillRef>
+          <a:effectRef idx="0">
+            <a:schemeClr val="accent1"/>
+          </a:effectRef>
+          <a:fontRef idx="minor">
+            <a:schemeClr val="lt1"/>
+          </a:fontRef>
+        </p:style>
+        <p:txBody>
+          <a:bodyPr rtlCol="0" anchor="ctr"/>
+          <a:lstStyle/>
+          <a:p>
+            <a:pPr algn="ctr"/>
+            <a:endParaRPr lang="en-US"/>
+          </a:p>
+        </p:txBody>
+      </p:sp>
+      <p:sp>
+        <p:nvSpPr>
+          <p:cNvPr id="15" name="TextBox 14"/>
+          <p:cNvSpPr txBox="1"/>
+          <p:nvPr/>
+        </p:nvSpPr>
+        <p:spPr>
+          <a:xfrm>
+            <a:off x="2362200" y="0"/>
+            <a:ext cx="533400" cy="369332"/>
+          </a:xfrm>
+          <a:prstGeom prst="rect">
+            <a:avLst/>
+          </a:prstGeom>
+          <a:noFill/>
+        </p:spPr>
+        <p:txBody>
+          <a:bodyPr wrap="square" rtlCol="0">
+            <a:spAutoFit/>
+          </a:bodyPr>
+          <a:lstStyle/>
+          <a:p>
+            <a:r>
+              <a:rPr lang="en-US" dirty="0" smtClean="0"/>
+              <a:t>N1</a:t>
+            </a:r>
+            <a:endParaRPr lang="en-US" dirty="0"/>
+          </a:p>
+        </p:txBody>
+      </p:sp>
+      <p:sp>
+        <p:nvSpPr>
+          <p:cNvPr id="16" name="TextBox 15"/>
+          <p:cNvSpPr txBox="1"/>
+          <p:nvPr/>
+        </p:nvSpPr>
+        <p:spPr>
+          <a:xfrm>
+            <a:off x="3733800" y="0"/>
+            <a:ext cx="533400" cy="369332"/>
+          </a:xfrm>
+          <a:prstGeom prst="rect">
+            <a:avLst/>
+          </a:prstGeom>
+          <a:noFill/>
+        </p:spPr>
+        <p:txBody>
+          <a:bodyPr wrap="square" rtlCol="0">
+            <a:spAutoFit/>
+          </a:bodyPr>
+          <a:lstStyle/>
+          <a:p>
+            <a:r>
+              <a:rPr lang="en-US" dirty="0" smtClean="0"/>
+              <a:t>N2</a:t>
+            </a:r>
+            <a:endParaRPr lang="en-US" dirty="0"/>
+          </a:p>
+        </p:txBody>
+      </p:sp>
+      <p:sp>
+        <p:nvSpPr>
+          <p:cNvPr id="17" name="TextBox 16"/>
+          <p:cNvSpPr txBox="1"/>
+          <p:nvPr/>
+        </p:nvSpPr>
+        <p:spPr>
+          <a:xfrm>
+            <a:off x="5029200" y="0"/>
+            <a:ext cx="533400" cy="369332"/>
+          </a:xfrm>
+          <a:prstGeom prst="rect">
+            <a:avLst/>
+          </a:prstGeom>
+          <a:noFill/>
+        </p:spPr>
+        <p:txBody>
+          <a:bodyPr wrap="square" rtlCol="0">
+            <a:spAutoFit/>
+          </a:bodyPr>
+          <a:lstStyle/>
+          <a:p>
+            <a:r>
+              <a:rPr lang="en-US" dirty="0" smtClean="0"/>
+              <a:t>N3</a:t>
+            </a:r>
+            <a:endParaRPr lang="en-US" dirty="0"/>
+          </a:p>
+        </p:txBody>
+      </p:sp>
+      <p:sp>
+        <p:nvSpPr>
+          <p:cNvPr id="18" name="TextBox 17"/>
+          <p:cNvSpPr txBox="1"/>
+          <p:nvPr/>
+        </p:nvSpPr>
+        <p:spPr>
+          <a:xfrm>
+            <a:off x="2209800" y="2971800"/>
+            <a:ext cx="533400" cy="369332"/>
+          </a:xfrm>
+          <a:prstGeom prst="rect">
+            <a:avLst/>
+          </a:prstGeom>
+          <a:noFill/>
+        </p:spPr>
+        <p:txBody>
+          <a:bodyPr wrap="square" rtlCol="0">
+            <a:spAutoFit/>
+          </a:bodyPr>
+          <a:lstStyle/>
+          <a:p>
+            <a:r>
+              <a:rPr lang="en-US" dirty="0" smtClean="0"/>
+              <a:t>f1</a:t>
+            </a:r>
+            <a:endParaRPr lang="en-US" dirty="0"/>
+          </a:p>
+        </p:txBody>
+      </p:sp>
+      <p:sp>
+        <p:nvSpPr>
+          <p:cNvPr id="19" name="TextBox 18"/>
+          <p:cNvSpPr txBox="1"/>
+          <p:nvPr/>
+        </p:nvSpPr>
+        <p:spPr>
+          <a:xfrm>
+            <a:off x="5105400" y="2590800"/>
+            <a:ext cx="533400" cy="369332"/>
+          </a:xfrm>
+          <a:prstGeom prst="rect">
+            <a:avLst/>
+          </a:prstGeom>
+          <a:noFill/>
+        </p:spPr>
+        <p:txBody>
+          <a:bodyPr wrap="square" rtlCol="0">
+            <a:spAutoFit/>
+          </a:bodyPr>
+          <a:lstStyle/>
+          <a:p>
+            <a:r>
+              <a:rPr lang="en-US" dirty="0" smtClean="0"/>
+              <a:t>f3</a:t>
+            </a:r>
+            <a:endParaRPr lang="en-US" dirty="0"/>
+          </a:p>
+        </p:txBody>
+      </p:sp>
+      <p:sp>
+        <p:nvSpPr>
+          <p:cNvPr id="20" name="TextBox 19"/>
+          <p:cNvSpPr txBox="1"/>
+          <p:nvPr/>
+        </p:nvSpPr>
+        <p:spPr>
+          <a:xfrm>
+            <a:off x="3810000" y="2895600"/>
+            <a:ext cx="533400" cy="369332"/>
+          </a:xfrm>
+          <a:prstGeom prst="rect">
+            <a:avLst/>
+          </a:prstGeom>
+          <a:noFill/>
+        </p:spPr>
+        <p:txBody>
+          <a:bodyPr wrap="square" rtlCol="0">
+            <a:spAutoFit/>
+          </a:bodyPr>
+          <a:lstStyle/>
+          <a:p>
+            <a:r>
+              <a:rPr lang="en-US" dirty="0" smtClean="0"/>
+              <a:t>f2</a:t>
+            </a:r>
+            <a:endParaRPr lang="en-US" dirty="0"/>
+          </a:p>
+        </p:txBody>
+      </p:sp>
+      <p:cxnSp>
+        <p:nvCxnSpPr>
+          <p:cNvPr id="21" name="Straight Arrow Connector 20"/>
+          <p:cNvCxnSpPr/>
+          <p:nvPr/>
+        </p:nvCxnSpPr>
+        <p:spPr>
+          <a:xfrm>
+            <a:off x="3293226" y="972591"/>
+            <a:ext cx="0" cy="1905000"/>
+          </a:xfrm>
+          <a:prstGeom prst="straightConnector1">
+            <a:avLst/>
+          </a:prstGeom>
+          <a:ln w="25400">
+            <a:solidFill>
+              <a:schemeClr val="accent6">
+                <a:lumMod val="60000"/>
+                <a:lumOff val="40000"/>
+              </a:schemeClr>
+            </a:solidFill>
+            <a:prstDash val="sysDot"/>
+            <a:tailEnd type="triangle"/>
+          </a:ln>
+        </p:spPr>
+        <p:style>
+          <a:lnRef idx="1">
+            <a:schemeClr val="accent1"/>
+          </a:lnRef>
+          <a:fillRef idx="0">
+            <a:schemeClr val="accent1"/>
+          </a:fillRef>
+          <a:effectRef idx="0">
+            <a:schemeClr val="accent1"/>
+          </a:effectRef>
+          <a:fontRef idx="minor">
+            <a:schemeClr val="tx1"/>
+          </a:fontRef>
+        </p:style>
+      </p:cxnSp>
+      <p:cxnSp>
+        <p:nvCxnSpPr>
+          <p:cNvPr id="22" name="Straight Arrow Connector 21"/>
+          <p:cNvCxnSpPr/>
+          <p:nvPr/>
+        </p:nvCxnSpPr>
+        <p:spPr>
+          <a:xfrm>
+            <a:off x="4648200" y="990600"/>
+            <a:ext cx="0" cy="1524000"/>
+          </a:xfrm>
+          <a:prstGeom prst="straightConnector1">
+            <a:avLst/>
+          </a:prstGeom>
+          <a:ln w="25400">
+            <a:solidFill>
+              <a:schemeClr val="accent6">
+                <a:lumMod val="60000"/>
+                <a:lumOff val="40000"/>
+              </a:schemeClr>
+            </a:solidFill>
+            <a:prstDash val="sysDot"/>
+            <a:tailEnd type="triangle"/>
+          </a:ln>
+        </p:spPr>
+        <p:style>
+          <a:lnRef idx="1">
+            <a:schemeClr val="accent1"/>
+          </a:lnRef>
+          <a:fillRef idx="0">
+            <a:schemeClr val="accent1"/>
+          </a:fillRef>
+          <a:effectRef idx="0">
+            <a:schemeClr val="accent1"/>
+          </a:effectRef>
+          <a:fontRef idx="minor">
+            <a:schemeClr val="tx1"/>
+          </a:fontRef>
+        </p:style>
+      </p:cxnSp>
+      <p:sp>
+        <p:nvSpPr>
+          <p:cNvPr id="24" name="TextBox 23"/>
+          <p:cNvSpPr txBox="1"/>
+          <p:nvPr/>
+        </p:nvSpPr>
+        <p:spPr>
+          <a:xfrm>
+            <a:off x="3276600" y="2438400"/>
+            <a:ext cx="533400" cy="369332"/>
+          </a:xfrm>
+          <a:prstGeom prst="rect">
+            <a:avLst/>
+          </a:prstGeom>
+          <a:noFill/>
+        </p:spPr>
+        <p:txBody>
+          <a:bodyPr wrap="square" rtlCol="0">
+            <a:spAutoFit/>
+          </a:bodyPr>
+          <a:lstStyle/>
+          <a:p>
+            <a:r>
+              <a:rPr lang="en-US" dirty="0" smtClean="0"/>
+              <a:t>f12</a:t>
+            </a:r>
+            <a:endParaRPr lang="en-US" dirty="0"/>
+          </a:p>
+        </p:txBody>
+      </p:sp>
+      <p:sp>
+        <p:nvSpPr>
+          <p:cNvPr id="25" name="TextBox 24"/>
+          <p:cNvSpPr txBox="1"/>
+          <p:nvPr/>
+        </p:nvSpPr>
+        <p:spPr>
+          <a:xfrm>
+            <a:off x="4631574" y="2133600"/>
+            <a:ext cx="533400" cy="369332"/>
+          </a:xfrm>
+          <a:prstGeom prst="rect">
+            <a:avLst/>
+          </a:prstGeom>
+          <a:noFill/>
+        </p:spPr>
+        <p:txBody>
+          <a:bodyPr wrap="square" rtlCol="0">
+            <a:spAutoFit/>
+          </a:bodyPr>
+          <a:lstStyle/>
+          <a:p>
+            <a:r>
+              <a:rPr lang="en-US" dirty="0" smtClean="0"/>
+              <a:t>f23</a:t>
+            </a:r>
+            <a:endParaRPr lang="en-US" dirty="0"/>
+          </a:p>
+        </p:txBody>
+      </p:sp>
+      <p:sp>
+        <p:nvSpPr>
+          <p:cNvPr id="26" name="TextBox 25"/>
+          <p:cNvSpPr txBox="1"/>
+          <p:nvPr/>
+        </p:nvSpPr>
+        <p:spPr>
+          <a:xfrm>
+            <a:off x="3276600" y="1524000"/>
+            <a:ext cx="609600" cy="369332"/>
+          </a:xfrm>
+          <a:prstGeom prst="rect">
+            <a:avLst/>
+          </a:prstGeom>
+          <a:noFill/>
+        </p:spPr>
+        <p:txBody>
+          <a:bodyPr wrap="square" rtlCol="0">
+            <a:spAutoFit/>
+          </a:bodyPr>
+          <a:lstStyle/>
+          <a:p>
+            <a:r>
+              <a:rPr lang="en-US" dirty="0" smtClean="0"/>
+              <a:t>el12</a:t>
+            </a:r>
+            <a:endParaRPr lang="en-US" dirty="0"/>
+          </a:p>
+        </p:txBody>
+      </p:sp>
+      <p:sp>
+        <p:nvSpPr>
+          <p:cNvPr id="27" name="TextBox 26"/>
+          <p:cNvSpPr txBox="1"/>
+          <p:nvPr/>
+        </p:nvSpPr>
+        <p:spPr>
+          <a:xfrm>
+            <a:off x="4038600" y="1524000"/>
+            <a:ext cx="609600" cy="369332"/>
+          </a:xfrm>
+          <a:prstGeom prst="rect">
+            <a:avLst/>
+          </a:prstGeom>
+          <a:noFill/>
+        </p:spPr>
+        <p:txBody>
+          <a:bodyPr wrap="square" rtlCol="0">
+            <a:spAutoFit/>
+          </a:bodyPr>
+          <a:lstStyle/>
+          <a:p>
+            <a:r>
+              <a:rPr lang="en-US" dirty="0" smtClean="0"/>
+              <a:t>el23</a:t>
+            </a:r>
+            <a:endParaRPr lang="en-US" dirty="0"/>
+          </a:p>
+        </p:txBody>
+      </p:sp>
+      <p:sp>
+        <p:nvSpPr>
+          <p:cNvPr id="28" name="TextBox 27"/>
+          <p:cNvSpPr txBox="1"/>
+          <p:nvPr/>
+        </p:nvSpPr>
+        <p:spPr>
+          <a:xfrm>
+            <a:off x="0" y="0"/>
+            <a:ext cx="2286000" cy="2585323"/>
+          </a:xfrm>
+          <a:prstGeom prst="rect">
+            <a:avLst/>
+          </a:prstGeom>
+          <a:noFill/>
+        </p:spPr>
+        <p:txBody>
+          <a:bodyPr wrap="square" rtlCol="0">
+            <a:spAutoFit/>
+          </a:bodyPr>
+          <a:lstStyle/>
+          <a:p>
+            <a:r>
+              <a:rPr lang="en-US" dirty="0" smtClean="0"/>
+              <a:t>HARD NODES: N1, N3</a:t>
+            </a:r>
+          </a:p>
+          <a:p>
+            <a:r>
+              <a:rPr lang="en-US" dirty="0" smtClean="0"/>
+              <a:t>NODES by division: N2</a:t>
+            </a:r>
+          </a:p>
+          <a:p>
+            <a:r>
+              <a:rPr lang="en-US" dirty="0" smtClean="0"/>
+              <a:t>f</a:t>
+            </a:r>
+            <a:r>
+              <a:rPr lang="en-US" dirty="0" smtClean="0"/>
+              <a:t>1, f3 is known.</a:t>
+            </a:r>
+            <a:endParaRPr lang="en-US" dirty="0" smtClean="0"/>
+          </a:p>
+          <a:p>
+            <a:endParaRPr lang="en-US" dirty="0" smtClean="0"/>
+          </a:p>
+          <a:p>
+            <a:r>
+              <a:rPr lang="en-US" dirty="0" smtClean="0"/>
+              <a:t>Objective: to </a:t>
+            </a:r>
+            <a:r>
+              <a:rPr lang="en-US" dirty="0" err="1" smtClean="0"/>
+              <a:t>discretize</a:t>
+            </a:r>
+            <a:r>
+              <a:rPr lang="en-US" dirty="0" smtClean="0"/>
+              <a:t> distributed loading to concentrated loading  at NODES.</a:t>
+            </a:r>
+            <a:endParaRPr lang="en-US" dirty="0"/>
+          </a:p>
+        </p:txBody>
+      </p:sp>
+      <p:pic>
+        <p:nvPicPr>
+          <p:cNvPr id="1026" name="Picture 2"/>
+          <p:cNvPicPr>
+            <a:picLocks noChangeAspect="1" noChangeArrowheads="1"/>
+          </p:cNvPicPr>
+          <p:nvPr/>
+        </p:nvPicPr>
+        <p:blipFill>
+          <a:blip r:embed="rId3" cstate="print"/>
+          <a:srcRect l="24957" r="25014"/>
+          <a:stretch>
+            <a:fillRect/>
+          </a:stretch>
+        </p:blipFill>
+        <p:spPr bwMode="auto">
+          <a:xfrm>
+            <a:off x="5715000" y="3482975"/>
+            <a:ext cx="2743200" cy="3375025"/>
+          </a:xfrm>
+          <a:prstGeom prst="rect">
+            <a:avLst/>
+          </a:prstGeom>
+          <a:noFill/>
+          <a:ln w="9525">
+            <a:noFill/>
+            <a:miter lim="800000"/>
+            <a:headEnd/>
+            <a:tailEnd/>
+          </a:ln>
+          <a:effectLst/>
+        </p:spPr>
+      </p:pic>
+      <p:pic>
+        <p:nvPicPr>
+          <p:cNvPr id="30" name="Picture 2" descr="C:\Users\Jack\Desktop\Noname.png"/>
+          <p:cNvPicPr>
+            <a:picLocks noChangeAspect="1" noChangeArrowheads="1"/>
+          </p:cNvPicPr>
+          <p:nvPr/>
+        </p:nvPicPr>
+        <p:blipFill>
+          <a:blip r:embed="rId2" cstate="print"/>
+          <a:srcRect l="30000" t="12463" r="52500" b="66806"/>
+          <a:stretch>
+            <a:fillRect/>
+          </a:stretch>
+        </p:blipFill>
+        <p:spPr bwMode="auto">
+          <a:xfrm>
+            <a:off x="0" y="3657600"/>
+            <a:ext cx="4953000" cy="3200400"/>
+          </a:xfrm>
+          <a:prstGeom prst="rect">
+            <a:avLst/>
+          </a:prstGeom>
+          <a:noFill/>
+        </p:spPr>
+      </p:pic>
+      <p:sp>
+        <p:nvSpPr>
+          <p:cNvPr id="31" name="Oval 30"/>
+          <p:cNvSpPr>
+            <a:spLocks noChangeAspect="1"/>
+          </p:cNvSpPr>
+          <p:nvPr/>
+        </p:nvSpPr>
+        <p:spPr>
+          <a:xfrm>
+            <a:off x="601287" y="4073235"/>
+            <a:ext cx="381000" cy="381000"/>
+          </a:xfrm>
+          <a:prstGeom prst="ellipse">
+            <a:avLst/>
+          </a:prstGeom>
+          <a:noFill/>
+          <a:ln>
+            <a:solidFill>
+              <a:srgbClr val="FF0000"/>
+            </a:solidFill>
+          </a:ln>
+        </p:spPr>
+        <p:style>
+          <a:lnRef idx="2">
+            <a:schemeClr val="accent1">
+              <a:shade val="50000"/>
+            </a:schemeClr>
+          </a:lnRef>
+          <a:fillRef idx="1">
+            <a:schemeClr val="accent1"/>
+          </a:fillRef>
+          <a:effectRef idx="0">
+            <a:schemeClr val="accent1"/>
+          </a:effectRef>
+          <a:fontRef idx="minor">
+            <a:schemeClr val="lt1"/>
+          </a:fontRef>
+        </p:style>
+        <p:txBody>
+          <a:bodyPr rtlCol="0" anchor="ctr"/>
+          <a:lstStyle/>
+          <a:p>
+            <a:pPr algn="ctr"/>
+            <a:endParaRPr lang="en-US"/>
+          </a:p>
+        </p:txBody>
+      </p:sp>
+      <p:sp>
+        <p:nvSpPr>
+          <p:cNvPr id="32" name="Oval 31"/>
+          <p:cNvSpPr>
+            <a:spLocks noChangeAspect="1"/>
+          </p:cNvSpPr>
+          <p:nvPr/>
+        </p:nvSpPr>
+        <p:spPr>
+          <a:xfrm>
+            <a:off x="1956261" y="4081548"/>
+            <a:ext cx="381000" cy="381000"/>
+          </a:xfrm>
+          <a:prstGeom prst="ellipse">
+            <a:avLst/>
+          </a:prstGeom>
+          <a:noFill/>
+          <a:ln>
+            <a:solidFill>
+              <a:srgbClr val="FF0000"/>
+            </a:solidFill>
+          </a:ln>
+        </p:spPr>
+        <p:style>
+          <a:lnRef idx="2">
+            <a:schemeClr val="accent1">
+              <a:shade val="50000"/>
+            </a:schemeClr>
+          </a:lnRef>
+          <a:fillRef idx="1">
+            <a:schemeClr val="accent1"/>
+          </a:fillRef>
+          <a:effectRef idx="0">
+            <a:schemeClr val="accent1"/>
+          </a:effectRef>
+          <a:fontRef idx="minor">
+            <a:schemeClr val="lt1"/>
+          </a:fontRef>
+        </p:style>
+        <p:txBody>
+          <a:bodyPr rtlCol="0" anchor="ctr"/>
+          <a:lstStyle/>
+          <a:p>
+            <a:pPr algn="ctr"/>
+            <a:endParaRPr lang="en-US"/>
+          </a:p>
+        </p:txBody>
+      </p:sp>
+      <p:sp>
+        <p:nvSpPr>
+          <p:cNvPr id="33" name="Oval 32"/>
+          <p:cNvSpPr>
+            <a:spLocks noChangeAspect="1"/>
+          </p:cNvSpPr>
+          <p:nvPr/>
+        </p:nvSpPr>
+        <p:spPr>
+          <a:xfrm>
+            <a:off x="3251661" y="4081548"/>
+            <a:ext cx="381000" cy="381000"/>
+          </a:xfrm>
+          <a:prstGeom prst="ellipse">
+            <a:avLst/>
+          </a:prstGeom>
+          <a:noFill/>
+          <a:ln>
+            <a:solidFill>
+              <a:srgbClr val="FF0000"/>
+            </a:solidFill>
+          </a:ln>
+        </p:spPr>
+        <p:style>
+          <a:lnRef idx="2">
+            <a:schemeClr val="accent1">
+              <a:shade val="50000"/>
+            </a:schemeClr>
+          </a:lnRef>
+          <a:fillRef idx="1">
+            <a:schemeClr val="accent1"/>
+          </a:fillRef>
+          <a:effectRef idx="0">
+            <a:schemeClr val="accent1"/>
+          </a:effectRef>
+          <a:fontRef idx="minor">
+            <a:schemeClr val="lt1"/>
+          </a:fontRef>
+        </p:style>
+        <p:txBody>
+          <a:bodyPr rtlCol="0" anchor="ctr"/>
+          <a:lstStyle/>
+          <a:p>
+            <a:pPr algn="ctr"/>
+            <a:endParaRPr lang="en-US"/>
+          </a:p>
+        </p:txBody>
+      </p:sp>
+      <p:sp>
+        <p:nvSpPr>
+          <p:cNvPr id="34" name="TextBox 33"/>
+          <p:cNvSpPr txBox="1"/>
+          <p:nvPr/>
+        </p:nvSpPr>
+        <p:spPr>
+          <a:xfrm>
+            <a:off x="533400" y="3453939"/>
+            <a:ext cx="533400" cy="369332"/>
+          </a:xfrm>
+          <a:prstGeom prst="rect">
+            <a:avLst/>
+          </a:prstGeom>
+          <a:noFill/>
+        </p:spPr>
+        <p:txBody>
+          <a:bodyPr wrap="square" rtlCol="0">
+            <a:spAutoFit/>
+          </a:bodyPr>
+          <a:lstStyle/>
+          <a:p>
+            <a:r>
+              <a:rPr lang="en-US" dirty="0" smtClean="0"/>
+              <a:t>N1</a:t>
+            </a:r>
+            <a:endParaRPr lang="en-US" dirty="0"/>
+          </a:p>
+        </p:txBody>
+      </p:sp>
+      <p:sp>
+        <p:nvSpPr>
+          <p:cNvPr id="35" name="TextBox 34"/>
+          <p:cNvSpPr txBox="1"/>
+          <p:nvPr/>
+        </p:nvSpPr>
+        <p:spPr>
+          <a:xfrm>
+            <a:off x="1905000" y="3453939"/>
+            <a:ext cx="533400" cy="369332"/>
+          </a:xfrm>
+          <a:prstGeom prst="rect">
+            <a:avLst/>
+          </a:prstGeom>
+          <a:noFill/>
+        </p:spPr>
+        <p:txBody>
+          <a:bodyPr wrap="square" rtlCol="0">
+            <a:spAutoFit/>
+          </a:bodyPr>
+          <a:lstStyle/>
+          <a:p>
+            <a:r>
+              <a:rPr lang="en-US" dirty="0" smtClean="0"/>
+              <a:t>N2</a:t>
+            </a:r>
+            <a:endParaRPr lang="en-US" dirty="0"/>
+          </a:p>
+        </p:txBody>
+      </p:sp>
+      <p:sp>
+        <p:nvSpPr>
+          <p:cNvPr id="36" name="TextBox 35"/>
+          <p:cNvSpPr txBox="1"/>
+          <p:nvPr/>
+        </p:nvSpPr>
+        <p:spPr>
+          <a:xfrm>
+            <a:off x="3200400" y="3453939"/>
+            <a:ext cx="533400" cy="369332"/>
+          </a:xfrm>
+          <a:prstGeom prst="rect">
+            <a:avLst/>
+          </a:prstGeom>
+          <a:noFill/>
+        </p:spPr>
+        <p:txBody>
+          <a:bodyPr wrap="square" rtlCol="0">
+            <a:spAutoFit/>
+          </a:bodyPr>
+          <a:lstStyle/>
+          <a:p>
+            <a:r>
+              <a:rPr lang="en-US" dirty="0" smtClean="0"/>
+              <a:t>N3</a:t>
+            </a:r>
+            <a:endParaRPr lang="en-US" dirty="0"/>
+          </a:p>
+        </p:txBody>
+      </p:sp>
+      <p:cxnSp>
+        <p:nvCxnSpPr>
+          <p:cNvPr id="38" name="Straight Arrow Connector 37"/>
+          <p:cNvCxnSpPr>
+            <a:stCxn id="31" idx="4"/>
+          </p:cNvCxnSpPr>
+          <p:nvPr/>
+        </p:nvCxnSpPr>
+        <p:spPr>
+          <a:xfrm flipH="1">
+            <a:off x="762000" y="4454235"/>
+            <a:ext cx="29787" cy="1760913"/>
+          </a:xfrm>
+          <a:prstGeom prst="straightConnector1">
+            <a:avLst/>
+          </a:prstGeom>
+          <a:ln w="63500">
+            <a:solidFill>
+              <a:srgbClr val="FF0000"/>
+            </a:solidFill>
+            <a:tailEnd type="triangle" w="lg" len="lg"/>
+          </a:ln>
+        </p:spPr>
+        <p:style>
+          <a:lnRef idx="1">
+            <a:schemeClr val="accent1"/>
+          </a:lnRef>
+          <a:fillRef idx="0">
+            <a:schemeClr val="accent1"/>
+          </a:fillRef>
+          <a:effectRef idx="0">
+            <a:schemeClr val="accent1"/>
+          </a:effectRef>
+          <a:fontRef idx="minor">
+            <a:schemeClr val="tx1"/>
+          </a:fontRef>
+        </p:style>
+      </p:cxnSp>
+      <p:cxnSp>
+        <p:nvCxnSpPr>
+          <p:cNvPr id="40" name="Straight Arrow Connector 39"/>
+          <p:cNvCxnSpPr>
+            <a:stCxn id="32" idx="4"/>
+          </p:cNvCxnSpPr>
+          <p:nvPr/>
+        </p:nvCxnSpPr>
+        <p:spPr>
+          <a:xfrm flipH="1">
+            <a:off x="2133600" y="4462548"/>
+            <a:ext cx="13161" cy="2209800"/>
+          </a:xfrm>
+          <a:prstGeom prst="straightConnector1">
+            <a:avLst/>
+          </a:prstGeom>
+          <a:ln w="63500">
+            <a:solidFill>
+              <a:srgbClr val="FF0000"/>
+            </a:solidFill>
+            <a:tailEnd type="triangle" w="lg" len="lg"/>
+          </a:ln>
+        </p:spPr>
+        <p:style>
+          <a:lnRef idx="1">
+            <a:schemeClr val="accent1"/>
+          </a:lnRef>
+          <a:fillRef idx="0">
+            <a:schemeClr val="accent1"/>
+          </a:fillRef>
+          <a:effectRef idx="0">
+            <a:schemeClr val="accent1"/>
+          </a:effectRef>
+          <a:fontRef idx="minor">
+            <a:schemeClr val="tx1"/>
+          </a:fontRef>
+        </p:style>
+      </p:cxnSp>
+      <p:cxnSp>
+        <p:nvCxnSpPr>
+          <p:cNvPr id="42" name="Straight Arrow Connector 41"/>
+          <p:cNvCxnSpPr>
+            <a:stCxn id="33" idx="4"/>
+          </p:cNvCxnSpPr>
+          <p:nvPr/>
+        </p:nvCxnSpPr>
+        <p:spPr>
+          <a:xfrm flipH="1">
+            <a:off x="3429000" y="4462548"/>
+            <a:ext cx="13161" cy="1295400"/>
+          </a:xfrm>
+          <a:prstGeom prst="straightConnector1">
+            <a:avLst/>
+          </a:prstGeom>
+          <a:ln w="63500">
+            <a:solidFill>
+              <a:srgbClr val="FF0000"/>
+            </a:solidFill>
+            <a:tailEnd type="triangle" w="lg" len="lg"/>
+          </a:ln>
+        </p:spPr>
+        <p:style>
+          <a:lnRef idx="1">
+            <a:schemeClr val="accent1"/>
+          </a:lnRef>
+          <a:fillRef idx="0">
+            <a:schemeClr val="accent1"/>
+          </a:fillRef>
+          <a:effectRef idx="0">
+            <a:schemeClr val="accent1"/>
+          </a:effectRef>
+          <a:fontRef idx="minor">
+            <a:schemeClr val="tx1"/>
+          </a:fontRef>
+        </p:style>
+      </p:cxnSp>
+      <p:sp>
+        <p:nvSpPr>
+          <p:cNvPr id="43" name="TextBox 42"/>
+          <p:cNvSpPr txBox="1"/>
+          <p:nvPr/>
+        </p:nvSpPr>
+        <p:spPr>
+          <a:xfrm>
+            <a:off x="990600" y="5879068"/>
+            <a:ext cx="533400" cy="369332"/>
+          </a:xfrm>
+          <a:prstGeom prst="rect">
+            <a:avLst/>
+          </a:prstGeom>
+          <a:noFill/>
+        </p:spPr>
+        <p:txBody>
+          <a:bodyPr wrap="square" rtlCol="0">
+            <a:spAutoFit/>
+          </a:bodyPr>
+          <a:lstStyle/>
+          <a:p>
+            <a:r>
+              <a:rPr lang="en-US" dirty="0" smtClean="0"/>
+              <a:t>V</a:t>
+            </a:r>
+            <a:r>
+              <a:rPr lang="en-US" dirty="0" smtClean="0"/>
+              <a:t>1</a:t>
+            </a:r>
+            <a:endParaRPr lang="en-US" dirty="0"/>
+          </a:p>
+        </p:txBody>
+      </p:sp>
+      <p:sp>
+        <p:nvSpPr>
+          <p:cNvPr id="44" name="TextBox 43"/>
+          <p:cNvSpPr txBox="1"/>
+          <p:nvPr/>
+        </p:nvSpPr>
+        <p:spPr>
+          <a:xfrm>
+            <a:off x="2286000" y="6260068"/>
+            <a:ext cx="533400" cy="369332"/>
+          </a:xfrm>
+          <a:prstGeom prst="rect">
+            <a:avLst/>
+          </a:prstGeom>
+          <a:noFill/>
+        </p:spPr>
+        <p:txBody>
+          <a:bodyPr wrap="square" rtlCol="0">
+            <a:spAutoFit/>
+          </a:bodyPr>
+          <a:lstStyle/>
+          <a:p>
+            <a:r>
+              <a:rPr lang="en-US" dirty="0" smtClean="0"/>
+              <a:t>V2</a:t>
+            </a:r>
+            <a:endParaRPr lang="en-US" dirty="0"/>
+          </a:p>
+        </p:txBody>
+      </p:sp>
+      <p:sp>
+        <p:nvSpPr>
+          <p:cNvPr id="45" name="TextBox 44"/>
+          <p:cNvSpPr txBox="1"/>
+          <p:nvPr/>
+        </p:nvSpPr>
+        <p:spPr>
+          <a:xfrm>
+            <a:off x="2819400" y="5334000"/>
+            <a:ext cx="533400" cy="369332"/>
+          </a:xfrm>
+          <a:prstGeom prst="rect">
+            <a:avLst/>
+          </a:prstGeom>
+          <a:noFill/>
+        </p:spPr>
+        <p:txBody>
+          <a:bodyPr wrap="square" rtlCol="0">
+            <a:spAutoFit/>
+          </a:bodyPr>
+          <a:lstStyle/>
+          <a:p>
+            <a:r>
+              <a:rPr lang="en-US" dirty="0" smtClean="0"/>
+              <a:t>V3</a:t>
+            </a:r>
+            <a:endParaRPr lang="en-US" dirty="0"/>
+          </a:p>
+        </p:txBody>
+      </p:sp>
+      <p:sp>
+        <p:nvSpPr>
+          <p:cNvPr id="47" name="Rectangle 46"/>
+          <p:cNvSpPr/>
+          <p:nvPr/>
+        </p:nvSpPr>
+        <p:spPr>
+          <a:xfrm>
+            <a:off x="2743201" y="6211669"/>
+            <a:ext cx="3048000" cy="646331"/>
+          </a:xfrm>
+          <a:prstGeom prst="rect">
+            <a:avLst/>
+          </a:prstGeom>
+        </p:spPr>
+        <p:txBody>
+          <a:bodyPr wrap="square">
+            <a:spAutoFit/>
+          </a:bodyPr>
+          <a:lstStyle/>
+          <a:p>
+            <a:r>
+              <a:rPr lang="en-US" dirty="0" smtClean="0"/>
+              <a:t>V1/2/3 is </a:t>
+            </a:r>
+            <a:r>
+              <a:rPr lang="en-US" dirty="0" err="1" smtClean="0"/>
+              <a:t>fz</a:t>
+            </a:r>
+            <a:r>
+              <a:rPr lang="en-US" dirty="0" smtClean="0"/>
+              <a:t> or my for each </a:t>
+            </a:r>
+            <a:r>
+              <a:rPr lang="en-US" dirty="0" smtClean="0"/>
+              <a:t>node in $loading array</a:t>
             </a:r>
             <a:endParaRPr lang="en-US" dirty="0"/>
           </a:p>

</xml_diff>

<commit_message>
perfected the loading calculation
</commit_message>
<xml_diff>
--- a/PHP_Process_Data_From_MySQL/beam_analysis/beam_analysis.pptx
+++ b/PHP_Process_Data_From_MySQL/beam_analysis/beam_analysis.pptx
@@ -20,6 +20,8 @@
     <p:sldId id="271" r:id="rId14"/>
     <p:sldId id="272" r:id="rId15"/>
     <p:sldId id="273" r:id="rId16"/>
+    <p:sldId id="275" r:id="rId17"/>
+    <p:sldId id="274" r:id="rId18"/>
   </p:sldIdLst>
   <p:sldSz cx="9144000" cy="6858000" type="screen4x3"/>
   <p:notesSz cx="6858000" cy="9144000"/>
@@ -303,7 +305,7 @@
             <a:fld id="{1D8BD707-D9CF-40AE-B4C6-C98DA3205C09}" type="datetimeFigureOut">
               <a:rPr lang="en-US" smtClean="0"/>
               <a:pPr/>
-              <a:t>1/11/2016</a:t>
+              <a:t>1/13/2016</a:t>
             </a:fld>
             <a:endParaRPr lang="en-US"/>
           </a:p>
@@ -470,7 +472,7 @@
             <a:fld id="{1D8BD707-D9CF-40AE-B4C6-C98DA3205C09}" type="datetimeFigureOut">
               <a:rPr lang="en-US" smtClean="0"/>
               <a:pPr/>
-              <a:t>1/11/2016</a:t>
+              <a:t>1/13/2016</a:t>
             </a:fld>
             <a:endParaRPr lang="en-US"/>
           </a:p>
@@ -647,7 +649,7 @@
             <a:fld id="{1D8BD707-D9CF-40AE-B4C6-C98DA3205C09}" type="datetimeFigureOut">
               <a:rPr lang="en-US" smtClean="0"/>
               <a:pPr/>
-              <a:t>1/11/2016</a:t>
+              <a:t>1/13/2016</a:t>
             </a:fld>
             <a:endParaRPr lang="en-US"/>
           </a:p>
@@ -814,7 +816,7 @@
             <a:fld id="{1D8BD707-D9CF-40AE-B4C6-C98DA3205C09}" type="datetimeFigureOut">
               <a:rPr lang="en-US" smtClean="0"/>
               <a:pPr/>
-              <a:t>1/11/2016</a:t>
+              <a:t>1/13/2016</a:t>
             </a:fld>
             <a:endParaRPr lang="en-US"/>
           </a:p>
@@ -1057,7 +1059,7 @@
             <a:fld id="{1D8BD707-D9CF-40AE-B4C6-C98DA3205C09}" type="datetimeFigureOut">
               <a:rPr lang="en-US" smtClean="0"/>
               <a:pPr/>
-              <a:t>1/11/2016</a:t>
+              <a:t>1/13/2016</a:t>
             </a:fld>
             <a:endParaRPr lang="en-US"/>
           </a:p>
@@ -1342,7 +1344,7 @@
             <a:fld id="{1D8BD707-D9CF-40AE-B4C6-C98DA3205C09}" type="datetimeFigureOut">
               <a:rPr lang="en-US" smtClean="0"/>
               <a:pPr/>
-              <a:t>1/11/2016</a:t>
+              <a:t>1/13/2016</a:t>
             </a:fld>
             <a:endParaRPr lang="en-US"/>
           </a:p>
@@ -1761,7 +1763,7 @@
             <a:fld id="{1D8BD707-D9CF-40AE-B4C6-C98DA3205C09}" type="datetimeFigureOut">
               <a:rPr lang="en-US" smtClean="0"/>
               <a:pPr/>
-              <a:t>1/11/2016</a:t>
+              <a:t>1/13/2016</a:t>
             </a:fld>
             <a:endParaRPr lang="en-US"/>
           </a:p>
@@ -1876,7 +1878,7 @@
             <a:fld id="{1D8BD707-D9CF-40AE-B4C6-C98DA3205C09}" type="datetimeFigureOut">
               <a:rPr lang="en-US" smtClean="0"/>
               <a:pPr/>
-              <a:t>1/11/2016</a:t>
+              <a:t>1/13/2016</a:t>
             </a:fld>
             <a:endParaRPr lang="en-US"/>
           </a:p>
@@ -1968,7 +1970,7 @@
             <a:fld id="{1D8BD707-D9CF-40AE-B4C6-C98DA3205C09}" type="datetimeFigureOut">
               <a:rPr lang="en-US" smtClean="0"/>
               <a:pPr/>
-              <a:t>1/11/2016</a:t>
+              <a:t>1/13/2016</a:t>
             </a:fld>
             <a:endParaRPr lang="en-US"/>
           </a:p>
@@ -2242,7 +2244,7 @@
             <a:fld id="{1D8BD707-D9CF-40AE-B4C6-C98DA3205C09}" type="datetimeFigureOut">
               <a:rPr lang="en-US" smtClean="0"/>
               <a:pPr/>
-              <a:t>1/11/2016</a:t>
+              <a:t>1/13/2016</a:t>
             </a:fld>
             <a:endParaRPr lang="en-US"/>
           </a:p>
@@ -2492,7 +2494,7 @@
             <a:fld id="{1D8BD707-D9CF-40AE-B4C6-C98DA3205C09}" type="datetimeFigureOut">
               <a:rPr lang="en-US" smtClean="0"/>
               <a:pPr/>
-              <a:t>1/11/2016</a:t>
+              <a:t>1/13/2016</a:t>
             </a:fld>
             <a:endParaRPr lang="en-US"/>
           </a:p>
@@ -2702,7 +2704,7 @@
             <a:fld id="{1D8BD707-D9CF-40AE-B4C6-C98DA3205C09}" type="datetimeFigureOut">
               <a:rPr lang="en-US" smtClean="0"/>
               <a:pPr/>
-              <a:t>1/11/2016</a:t>
+              <a:t>1/13/2016</a:t>
             </a:fld>
             <a:endParaRPr lang="en-US"/>
           </a:p>
@@ -8556,332 +8558,16 @@
           <a:chExt cx="0" cy="0"/>
         </a:xfrm>
       </p:grpSpPr>
-      <p:pic>
-        <p:nvPicPr>
-          <p:cNvPr id="4" name="Picture 2" descr="C:\Users\Jack\Desktop\Noname.png"/>
-          <p:cNvPicPr>
-            <a:picLocks noChangeAspect="1" noChangeArrowheads="1"/>
-          </p:cNvPicPr>
-          <p:nvPr/>
-        </p:nvPicPr>
-        <p:blipFill>
-          <a:blip r:embed="rId2" cstate="print"/>
-          <a:srcRect l="30000" t="12463" r="52500" b="66806"/>
-          <a:stretch>
-            <a:fillRect/>
-          </a:stretch>
-        </p:blipFill>
-        <p:spPr bwMode="auto">
-          <a:xfrm>
-            <a:off x="1828800" y="228600"/>
-            <a:ext cx="4953000" cy="3200400"/>
-          </a:xfrm>
-          <a:prstGeom prst="rect">
-            <a:avLst/>
-          </a:prstGeom>
-          <a:noFill/>
-        </p:spPr>
-      </p:pic>
-      <p:cxnSp>
-        <p:nvCxnSpPr>
-          <p:cNvPr id="6" name="Straight Arrow Connector 5"/>
-          <p:cNvCxnSpPr/>
-          <p:nvPr/>
-        </p:nvCxnSpPr>
-        <p:spPr>
-          <a:xfrm>
-            <a:off x="5257800" y="838200"/>
-            <a:ext cx="0" cy="1600200"/>
-          </a:xfrm>
-          <a:prstGeom prst="straightConnector1">
-            <a:avLst/>
-          </a:prstGeom>
-          <a:ln w="25400">
-            <a:solidFill>
-              <a:schemeClr val="tx1"/>
-            </a:solidFill>
-            <a:tailEnd type="triangle"/>
-          </a:ln>
-        </p:spPr>
-        <p:style>
-          <a:lnRef idx="1">
-            <a:schemeClr val="accent1"/>
-          </a:lnRef>
-          <a:fillRef idx="0">
-            <a:schemeClr val="accent1"/>
-          </a:fillRef>
-          <a:effectRef idx="0">
-            <a:schemeClr val="accent1"/>
-          </a:effectRef>
-          <a:fontRef idx="minor">
-            <a:schemeClr val="tx1"/>
-          </a:fontRef>
-        </p:style>
-      </p:cxnSp>
-      <p:cxnSp>
-        <p:nvCxnSpPr>
-          <p:cNvPr id="8" name="Straight Arrow Connector 7"/>
-          <p:cNvCxnSpPr/>
-          <p:nvPr/>
-        </p:nvCxnSpPr>
-        <p:spPr>
-          <a:xfrm>
-            <a:off x="3962400" y="838200"/>
-            <a:ext cx="0" cy="1905000"/>
-          </a:xfrm>
-          <a:prstGeom prst="straightConnector1">
-            <a:avLst/>
-          </a:prstGeom>
-          <a:ln w="25400">
-            <a:solidFill>
-              <a:schemeClr val="tx1"/>
-            </a:solidFill>
-            <a:tailEnd type="triangle"/>
-          </a:ln>
-        </p:spPr>
-        <p:style>
-          <a:lnRef idx="1">
-            <a:schemeClr val="accent1"/>
-          </a:lnRef>
-          <a:fillRef idx="0">
-            <a:schemeClr val="accent1"/>
-          </a:fillRef>
-          <a:effectRef idx="0">
-            <a:schemeClr val="accent1"/>
-          </a:effectRef>
-          <a:fontRef idx="minor">
-            <a:schemeClr val="tx1"/>
-          </a:fontRef>
-        </p:style>
-      </p:cxnSp>
-      <p:cxnSp>
-        <p:nvCxnSpPr>
-          <p:cNvPr id="10" name="Straight Arrow Connector 9"/>
-          <p:cNvCxnSpPr/>
-          <p:nvPr/>
-        </p:nvCxnSpPr>
-        <p:spPr>
-          <a:xfrm>
-            <a:off x="2743200" y="1905000"/>
-            <a:ext cx="1143000" cy="0"/>
-          </a:xfrm>
-          <a:prstGeom prst="straightConnector1">
-            <a:avLst/>
-          </a:prstGeom>
-          <a:ln w="25400">
-            <a:solidFill>
-              <a:schemeClr val="tx1"/>
-            </a:solidFill>
-            <a:headEnd type="triangle"/>
-            <a:tailEnd type="triangle"/>
-          </a:ln>
-        </p:spPr>
-        <p:style>
-          <a:lnRef idx="1">
-            <a:schemeClr val="accent1"/>
-          </a:lnRef>
-          <a:fillRef idx="0">
-            <a:schemeClr val="accent1"/>
-          </a:fillRef>
-          <a:effectRef idx="0">
-            <a:schemeClr val="accent1"/>
-          </a:effectRef>
-          <a:fontRef idx="minor">
-            <a:schemeClr val="tx1"/>
-          </a:fontRef>
-        </p:style>
-      </p:cxnSp>
-      <p:cxnSp>
-        <p:nvCxnSpPr>
-          <p:cNvPr id="11" name="Straight Arrow Connector 10"/>
-          <p:cNvCxnSpPr/>
-          <p:nvPr/>
-        </p:nvCxnSpPr>
-        <p:spPr>
-          <a:xfrm>
-            <a:off x="4038600" y="1905000"/>
-            <a:ext cx="1143000" cy="0"/>
-          </a:xfrm>
-          <a:prstGeom prst="straightConnector1">
-            <a:avLst/>
-          </a:prstGeom>
-          <a:ln w="25400">
-            <a:solidFill>
-              <a:schemeClr val="tx1"/>
-            </a:solidFill>
-            <a:headEnd type="triangle"/>
-            <a:tailEnd type="triangle"/>
-          </a:ln>
-        </p:spPr>
-        <p:style>
-          <a:lnRef idx="1">
-            <a:schemeClr val="accent1"/>
-          </a:lnRef>
-          <a:fillRef idx="0">
-            <a:schemeClr val="accent1"/>
-          </a:fillRef>
-          <a:effectRef idx="0">
-            <a:schemeClr val="accent1"/>
-          </a:effectRef>
-          <a:fontRef idx="minor">
-            <a:schemeClr val="tx1"/>
-          </a:fontRef>
-        </p:style>
-      </p:cxnSp>
-      <p:sp>
-        <p:nvSpPr>
-          <p:cNvPr id="12" name="Oval 11"/>
-          <p:cNvSpPr>
-            <a:spLocks noChangeAspect="1"/>
-          </p:cNvSpPr>
-          <p:nvPr/>
-        </p:nvSpPr>
-        <p:spPr>
-          <a:xfrm>
-            <a:off x="2430087" y="652548"/>
-            <a:ext cx="381000" cy="381000"/>
-          </a:xfrm>
-          <a:prstGeom prst="ellipse">
-            <a:avLst/>
-          </a:prstGeom>
-          <a:noFill/>
-          <a:ln>
-            <a:solidFill>
-              <a:srgbClr val="FF0000"/>
-            </a:solidFill>
-          </a:ln>
-        </p:spPr>
-        <p:style>
-          <a:lnRef idx="2">
-            <a:schemeClr val="accent1">
-              <a:shade val="50000"/>
-            </a:schemeClr>
-          </a:lnRef>
-          <a:fillRef idx="1">
-            <a:schemeClr val="accent1"/>
-          </a:fillRef>
-          <a:effectRef idx="0">
-            <a:schemeClr val="accent1"/>
-          </a:effectRef>
-          <a:fontRef idx="minor">
-            <a:schemeClr val="lt1"/>
-          </a:fontRef>
-        </p:style>
-        <p:txBody>
-          <a:bodyPr rtlCol="0" anchor="ctr"/>
-          <a:lstStyle/>
-          <a:p>
-            <a:pPr algn="ctr"/>
-            <a:endParaRPr lang="en-US"/>
-          </a:p>
-        </p:txBody>
-      </p:sp>
-      <p:sp>
-        <p:nvSpPr>
-          <p:cNvPr id="13" name="Oval 12"/>
-          <p:cNvSpPr>
-            <a:spLocks noChangeAspect="1"/>
-          </p:cNvSpPr>
-          <p:nvPr/>
-        </p:nvSpPr>
-        <p:spPr>
-          <a:xfrm>
-            <a:off x="3785061" y="660861"/>
-            <a:ext cx="381000" cy="381000"/>
-          </a:xfrm>
-          <a:prstGeom prst="ellipse">
-            <a:avLst/>
-          </a:prstGeom>
-          <a:noFill/>
-          <a:ln>
-            <a:solidFill>
-              <a:srgbClr val="FF0000"/>
-            </a:solidFill>
-          </a:ln>
-        </p:spPr>
-        <p:style>
-          <a:lnRef idx="2">
-            <a:schemeClr val="accent1">
-              <a:shade val="50000"/>
-            </a:schemeClr>
-          </a:lnRef>
-          <a:fillRef idx="1">
-            <a:schemeClr val="accent1"/>
-          </a:fillRef>
-          <a:effectRef idx="0">
-            <a:schemeClr val="accent1"/>
-          </a:effectRef>
-          <a:fontRef idx="minor">
-            <a:schemeClr val="lt1"/>
-          </a:fontRef>
-        </p:style>
-        <p:txBody>
-          <a:bodyPr rtlCol="0" anchor="ctr"/>
-          <a:lstStyle/>
-          <a:p>
-            <a:pPr algn="ctr"/>
-            <a:endParaRPr lang="en-US"/>
-          </a:p>
-        </p:txBody>
-      </p:sp>
-      <p:sp>
-        <p:nvSpPr>
-          <p:cNvPr id="14" name="Oval 13"/>
-          <p:cNvSpPr>
-            <a:spLocks noChangeAspect="1"/>
-          </p:cNvSpPr>
-          <p:nvPr/>
-        </p:nvSpPr>
-        <p:spPr>
-          <a:xfrm>
-            <a:off x="5080461" y="660861"/>
-            <a:ext cx="381000" cy="381000"/>
-          </a:xfrm>
-          <a:prstGeom prst="ellipse">
-            <a:avLst/>
-          </a:prstGeom>
-          <a:noFill/>
-          <a:ln>
-            <a:solidFill>
-              <a:srgbClr val="FF0000"/>
-            </a:solidFill>
-          </a:ln>
-        </p:spPr>
-        <p:style>
-          <a:lnRef idx="2">
-            <a:schemeClr val="accent1">
-              <a:shade val="50000"/>
-            </a:schemeClr>
-          </a:lnRef>
-          <a:fillRef idx="1">
-            <a:schemeClr val="accent1"/>
-          </a:fillRef>
-          <a:effectRef idx="0">
-            <a:schemeClr val="accent1"/>
-          </a:effectRef>
-          <a:fontRef idx="minor">
-            <a:schemeClr val="lt1"/>
-          </a:fontRef>
-        </p:style>
-        <p:txBody>
-          <a:bodyPr rtlCol="0" anchor="ctr"/>
-          <a:lstStyle/>
-          <a:p>
-            <a:pPr algn="ctr"/>
-            <a:endParaRPr lang="en-US"/>
-          </a:p>
-        </p:txBody>
-      </p:sp>
-      <p:sp>
-        <p:nvSpPr>
-          <p:cNvPr id="15" name="TextBox 14"/>
+      <p:sp>
+        <p:nvSpPr>
+          <p:cNvPr id="28" name="TextBox 27"/>
           <p:cNvSpPr txBox="1"/>
           <p:nvPr/>
         </p:nvSpPr>
         <p:spPr>
           <a:xfrm>
-            <a:off x="2362200" y="0"/>
-            <a:ext cx="533400" cy="369332"/>
+            <a:off x="0" y="0"/>
+            <a:ext cx="2286000" cy="2585323"/>
           </a:xfrm>
           <a:prstGeom prst="rect">
             <a:avLst/>
@@ -8896,386 +8582,6 @@
           <a:p>
             <a:r>
               <a:rPr lang="en-US" dirty="0" smtClean="0"/>
-              <a:t>N1</a:t>
-            </a:r>
-            <a:endParaRPr lang="en-US" dirty="0"/>
-          </a:p>
-        </p:txBody>
-      </p:sp>
-      <p:sp>
-        <p:nvSpPr>
-          <p:cNvPr id="16" name="TextBox 15"/>
-          <p:cNvSpPr txBox="1"/>
-          <p:nvPr/>
-        </p:nvSpPr>
-        <p:spPr>
-          <a:xfrm>
-            <a:off x="3733800" y="0"/>
-            <a:ext cx="533400" cy="369332"/>
-          </a:xfrm>
-          <a:prstGeom prst="rect">
-            <a:avLst/>
-          </a:prstGeom>
-          <a:noFill/>
-        </p:spPr>
-        <p:txBody>
-          <a:bodyPr wrap="square" rtlCol="0">
-            <a:spAutoFit/>
-          </a:bodyPr>
-          <a:lstStyle/>
-          <a:p>
-            <a:r>
-              <a:rPr lang="en-US" dirty="0" smtClean="0"/>
-              <a:t>N2</a:t>
-            </a:r>
-            <a:endParaRPr lang="en-US" dirty="0"/>
-          </a:p>
-        </p:txBody>
-      </p:sp>
-      <p:sp>
-        <p:nvSpPr>
-          <p:cNvPr id="17" name="TextBox 16"/>
-          <p:cNvSpPr txBox="1"/>
-          <p:nvPr/>
-        </p:nvSpPr>
-        <p:spPr>
-          <a:xfrm>
-            <a:off x="5029200" y="0"/>
-            <a:ext cx="533400" cy="369332"/>
-          </a:xfrm>
-          <a:prstGeom prst="rect">
-            <a:avLst/>
-          </a:prstGeom>
-          <a:noFill/>
-        </p:spPr>
-        <p:txBody>
-          <a:bodyPr wrap="square" rtlCol="0">
-            <a:spAutoFit/>
-          </a:bodyPr>
-          <a:lstStyle/>
-          <a:p>
-            <a:r>
-              <a:rPr lang="en-US" dirty="0" smtClean="0"/>
-              <a:t>N3</a:t>
-            </a:r>
-            <a:endParaRPr lang="en-US" dirty="0"/>
-          </a:p>
-        </p:txBody>
-      </p:sp>
-      <p:sp>
-        <p:nvSpPr>
-          <p:cNvPr id="18" name="TextBox 17"/>
-          <p:cNvSpPr txBox="1"/>
-          <p:nvPr/>
-        </p:nvSpPr>
-        <p:spPr>
-          <a:xfrm>
-            <a:off x="2209800" y="2971800"/>
-            <a:ext cx="533400" cy="369332"/>
-          </a:xfrm>
-          <a:prstGeom prst="rect">
-            <a:avLst/>
-          </a:prstGeom>
-          <a:noFill/>
-        </p:spPr>
-        <p:txBody>
-          <a:bodyPr wrap="square" rtlCol="0">
-            <a:spAutoFit/>
-          </a:bodyPr>
-          <a:lstStyle/>
-          <a:p>
-            <a:r>
-              <a:rPr lang="en-US" dirty="0" smtClean="0"/>
-              <a:t>f1</a:t>
-            </a:r>
-            <a:endParaRPr lang="en-US" dirty="0"/>
-          </a:p>
-        </p:txBody>
-      </p:sp>
-      <p:sp>
-        <p:nvSpPr>
-          <p:cNvPr id="19" name="TextBox 18"/>
-          <p:cNvSpPr txBox="1"/>
-          <p:nvPr/>
-        </p:nvSpPr>
-        <p:spPr>
-          <a:xfrm>
-            <a:off x="5105400" y="2590800"/>
-            <a:ext cx="533400" cy="369332"/>
-          </a:xfrm>
-          <a:prstGeom prst="rect">
-            <a:avLst/>
-          </a:prstGeom>
-          <a:noFill/>
-        </p:spPr>
-        <p:txBody>
-          <a:bodyPr wrap="square" rtlCol="0">
-            <a:spAutoFit/>
-          </a:bodyPr>
-          <a:lstStyle/>
-          <a:p>
-            <a:r>
-              <a:rPr lang="en-US" dirty="0" smtClean="0"/>
-              <a:t>f3</a:t>
-            </a:r>
-            <a:endParaRPr lang="en-US" dirty="0"/>
-          </a:p>
-        </p:txBody>
-      </p:sp>
-      <p:sp>
-        <p:nvSpPr>
-          <p:cNvPr id="20" name="TextBox 19"/>
-          <p:cNvSpPr txBox="1"/>
-          <p:nvPr/>
-        </p:nvSpPr>
-        <p:spPr>
-          <a:xfrm>
-            <a:off x="3810000" y="2895600"/>
-            <a:ext cx="533400" cy="369332"/>
-          </a:xfrm>
-          <a:prstGeom prst="rect">
-            <a:avLst/>
-          </a:prstGeom>
-          <a:noFill/>
-        </p:spPr>
-        <p:txBody>
-          <a:bodyPr wrap="square" rtlCol="0">
-            <a:spAutoFit/>
-          </a:bodyPr>
-          <a:lstStyle/>
-          <a:p>
-            <a:r>
-              <a:rPr lang="en-US" dirty="0" smtClean="0"/>
-              <a:t>f2</a:t>
-            </a:r>
-            <a:endParaRPr lang="en-US" dirty="0"/>
-          </a:p>
-        </p:txBody>
-      </p:sp>
-      <p:cxnSp>
-        <p:nvCxnSpPr>
-          <p:cNvPr id="21" name="Straight Arrow Connector 20"/>
-          <p:cNvCxnSpPr/>
-          <p:nvPr/>
-        </p:nvCxnSpPr>
-        <p:spPr>
-          <a:xfrm>
-            <a:off x="3293226" y="972591"/>
-            <a:ext cx="0" cy="1905000"/>
-          </a:xfrm>
-          <a:prstGeom prst="straightConnector1">
-            <a:avLst/>
-          </a:prstGeom>
-          <a:ln w="25400">
-            <a:solidFill>
-              <a:schemeClr val="accent6">
-                <a:lumMod val="60000"/>
-                <a:lumOff val="40000"/>
-              </a:schemeClr>
-            </a:solidFill>
-            <a:prstDash val="sysDot"/>
-            <a:tailEnd type="triangle"/>
-          </a:ln>
-        </p:spPr>
-        <p:style>
-          <a:lnRef idx="1">
-            <a:schemeClr val="accent1"/>
-          </a:lnRef>
-          <a:fillRef idx="0">
-            <a:schemeClr val="accent1"/>
-          </a:fillRef>
-          <a:effectRef idx="0">
-            <a:schemeClr val="accent1"/>
-          </a:effectRef>
-          <a:fontRef idx="minor">
-            <a:schemeClr val="tx1"/>
-          </a:fontRef>
-        </p:style>
-      </p:cxnSp>
-      <p:cxnSp>
-        <p:nvCxnSpPr>
-          <p:cNvPr id="22" name="Straight Arrow Connector 21"/>
-          <p:cNvCxnSpPr/>
-          <p:nvPr/>
-        </p:nvCxnSpPr>
-        <p:spPr>
-          <a:xfrm>
-            <a:off x="4648200" y="990600"/>
-            <a:ext cx="0" cy="1524000"/>
-          </a:xfrm>
-          <a:prstGeom prst="straightConnector1">
-            <a:avLst/>
-          </a:prstGeom>
-          <a:ln w="25400">
-            <a:solidFill>
-              <a:schemeClr val="accent6">
-                <a:lumMod val="60000"/>
-                <a:lumOff val="40000"/>
-              </a:schemeClr>
-            </a:solidFill>
-            <a:prstDash val="sysDot"/>
-            <a:tailEnd type="triangle"/>
-          </a:ln>
-        </p:spPr>
-        <p:style>
-          <a:lnRef idx="1">
-            <a:schemeClr val="accent1"/>
-          </a:lnRef>
-          <a:fillRef idx="0">
-            <a:schemeClr val="accent1"/>
-          </a:fillRef>
-          <a:effectRef idx="0">
-            <a:schemeClr val="accent1"/>
-          </a:effectRef>
-          <a:fontRef idx="minor">
-            <a:schemeClr val="tx1"/>
-          </a:fontRef>
-        </p:style>
-      </p:cxnSp>
-      <p:sp>
-        <p:nvSpPr>
-          <p:cNvPr id="24" name="TextBox 23"/>
-          <p:cNvSpPr txBox="1"/>
-          <p:nvPr/>
-        </p:nvSpPr>
-        <p:spPr>
-          <a:xfrm>
-            <a:off x="3276600" y="2438400"/>
-            <a:ext cx="533400" cy="369332"/>
-          </a:xfrm>
-          <a:prstGeom prst="rect">
-            <a:avLst/>
-          </a:prstGeom>
-          <a:noFill/>
-        </p:spPr>
-        <p:txBody>
-          <a:bodyPr wrap="square" rtlCol="0">
-            <a:spAutoFit/>
-          </a:bodyPr>
-          <a:lstStyle/>
-          <a:p>
-            <a:r>
-              <a:rPr lang="en-US" dirty="0" smtClean="0"/>
-              <a:t>f12</a:t>
-            </a:r>
-            <a:endParaRPr lang="en-US" dirty="0"/>
-          </a:p>
-        </p:txBody>
-      </p:sp>
-      <p:sp>
-        <p:nvSpPr>
-          <p:cNvPr id="25" name="TextBox 24"/>
-          <p:cNvSpPr txBox="1"/>
-          <p:nvPr/>
-        </p:nvSpPr>
-        <p:spPr>
-          <a:xfrm>
-            <a:off x="4631574" y="2133600"/>
-            <a:ext cx="533400" cy="369332"/>
-          </a:xfrm>
-          <a:prstGeom prst="rect">
-            <a:avLst/>
-          </a:prstGeom>
-          <a:noFill/>
-        </p:spPr>
-        <p:txBody>
-          <a:bodyPr wrap="square" rtlCol="0">
-            <a:spAutoFit/>
-          </a:bodyPr>
-          <a:lstStyle/>
-          <a:p>
-            <a:r>
-              <a:rPr lang="en-US" dirty="0" smtClean="0"/>
-              <a:t>f23</a:t>
-            </a:r>
-            <a:endParaRPr lang="en-US" dirty="0"/>
-          </a:p>
-        </p:txBody>
-      </p:sp>
-      <p:sp>
-        <p:nvSpPr>
-          <p:cNvPr id="26" name="TextBox 25"/>
-          <p:cNvSpPr txBox="1"/>
-          <p:nvPr/>
-        </p:nvSpPr>
-        <p:spPr>
-          <a:xfrm>
-            <a:off x="3276600" y="1524000"/>
-            <a:ext cx="609600" cy="369332"/>
-          </a:xfrm>
-          <a:prstGeom prst="rect">
-            <a:avLst/>
-          </a:prstGeom>
-          <a:noFill/>
-        </p:spPr>
-        <p:txBody>
-          <a:bodyPr wrap="square" rtlCol="0">
-            <a:spAutoFit/>
-          </a:bodyPr>
-          <a:lstStyle/>
-          <a:p>
-            <a:r>
-              <a:rPr lang="en-US" dirty="0" smtClean="0"/>
-              <a:t>el12</a:t>
-            </a:r>
-            <a:endParaRPr lang="en-US" dirty="0"/>
-          </a:p>
-        </p:txBody>
-      </p:sp>
-      <p:sp>
-        <p:nvSpPr>
-          <p:cNvPr id="27" name="TextBox 26"/>
-          <p:cNvSpPr txBox="1"/>
-          <p:nvPr/>
-        </p:nvSpPr>
-        <p:spPr>
-          <a:xfrm>
-            <a:off x="4038600" y="1524000"/>
-            <a:ext cx="609600" cy="369332"/>
-          </a:xfrm>
-          <a:prstGeom prst="rect">
-            <a:avLst/>
-          </a:prstGeom>
-          <a:noFill/>
-        </p:spPr>
-        <p:txBody>
-          <a:bodyPr wrap="square" rtlCol="0">
-            <a:spAutoFit/>
-          </a:bodyPr>
-          <a:lstStyle/>
-          <a:p>
-            <a:r>
-              <a:rPr lang="en-US" dirty="0" smtClean="0"/>
-              <a:t>el23</a:t>
-            </a:r>
-            <a:endParaRPr lang="en-US" dirty="0"/>
-          </a:p>
-        </p:txBody>
-      </p:sp>
-      <p:sp>
-        <p:nvSpPr>
-          <p:cNvPr id="28" name="TextBox 27"/>
-          <p:cNvSpPr txBox="1"/>
-          <p:nvPr/>
-        </p:nvSpPr>
-        <p:spPr>
-          <a:xfrm>
-            <a:off x="0" y="0"/>
-            <a:ext cx="2286000" cy="2585323"/>
-          </a:xfrm>
-          <a:prstGeom prst="rect">
-            <a:avLst/>
-          </a:prstGeom>
-          <a:noFill/>
-        </p:spPr>
-        <p:txBody>
-          <a:bodyPr wrap="square" rtlCol="0">
-            <a:spAutoFit/>
-          </a:bodyPr>
-          <a:lstStyle/>
-          <a:p>
-            <a:r>
-              <a:rPr lang="en-US" dirty="0" smtClean="0"/>
               <a:t>HARD NODES: N1, N3</a:t>
             </a:r>
           </a:p>
@@ -9288,13 +8594,8 @@
           <a:p>
             <a:r>
               <a:rPr lang="en-US" dirty="0" smtClean="0"/>
-              <a:t>f</a:t>
-            </a:r>
-            <a:r>
-              <a:rPr lang="en-US" dirty="0" smtClean="0"/>
-              <a:t>1, f3 is known.</a:t>
-            </a:r>
-            <a:endParaRPr lang="en-US" dirty="0" smtClean="0"/>
+              <a:t>f1, f3 is known.</a:t>
+            </a:r>
           </a:p>
           <a:p>
             <a:endParaRPr lang="en-US" dirty="0" smtClean="0"/>
@@ -9325,7 +8626,7 @@
           <p:nvPr/>
         </p:nvPicPr>
         <p:blipFill>
-          <a:blip r:embed="rId3" cstate="print"/>
+          <a:blip r:embed="rId2" cstate="print"/>
           <a:srcRect l="24957" r="25014"/>
           <a:stretch>
             <a:fillRect/>
@@ -9358,7 +8659,7 @@
           <p:nvPr/>
         </p:nvPicPr>
         <p:blipFill>
-          <a:blip r:embed="rId2" cstate="print"/>
+          <a:blip r:embed="rId3" cstate="print"/>
           <a:srcRect l="30000" t="12463" r="52500" b="66806"/>
           <a:stretch>
             <a:fillRect/>
@@ -9747,11 +9048,7 @@
           <a:p>
             <a:r>
               <a:rPr lang="en-US" dirty="0" smtClean="0"/>
-              <a:t>V</a:t>
-            </a:r>
-            <a:r>
-              <a:rPr lang="en-US" dirty="0" smtClean="0"/>
-              <a:t>1</a:t>
+              <a:t>V1</a:t>
             </a:r>
             <a:endParaRPr lang="en-US" dirty="0"/>
           </a:p>
@@ -9848,16 +9145,867 @@
             </a:r>
             <a:r>
               <a:rPr lang="en-US" dirty="0" smtClean="0"/>
-              <a:t> or my for each </a:t>
-            </a:r>
-            <a:r>
-              <a:rPr lang="en-US" dirty="0" smtClean="0"/>
-              <a:t>node in $loading array</a:t>
+              <a:t> or my for each node in $loading array</a:t>
             </a:r>
             <a:endParaRPr lang="en-US" dirty="0"/>
           </a:p>
         </p:txBody>
       </p:sp>
+      <p:grpSp>
+        <p:nvGrpSpPr>
+          <p:cNvPr id="51" name="Group 50"/>
+          <p:cNvGrpSpPr/>
+          <p:nvPr/>
+        </p:nvGrpSpPr>
+        <p:grpSpPr>
+          <a:xfrm>
+            <a:off x="1828800" y="0"/>
+            <a:ext cx="4953000" cy="3429000"/>
+            <a:chOff x="1828800" y="0"/>
+            <a:chExt cx="4953000" cy="3429000"/>
+          </a:xfrm>
+        </p:grpSpPr>
+        <p:pic>
+          <p:nvPicPr>
+            <p:cNvPr id="4" name="Picture 2" descr="C:\Users\Jack\Desktop\Noname.png"/>
+            <p:cNvPicPr>
+              <a:picLocks noChangeAspect="1" noChangeArrowheads="1"/>
+            </p:cNvPicPr>
+            <p:nvPr/>
+          </p:nvPicPr>
+          <p:blipFill>
+            <a:blip r:embed="rId3" cstate="print"/>
+            <a:srcRect l="30000" t="12463" r="52500" b="66806"/>
+            <a:stretch>
+              <a:fillRect/>
+            </a:stretch>
+          </p:blipFill>
+          <p:spPr bwMode="auto">
+            <a:xfrm>
+              <a:off x="1828800" y="228600"/>
+              <a:ext cx="4953000" cy="3200400"/>
+            </a:xfrm>
+            <a:prstGeom prst="rect">
+              <a:avLst/>
+            </a:prstGeom>
+            <a:noFill/>
+          </p:spPr>
+        </p:pic>
+        <p:cxnSp>
+          <p:nvCxnSpPr>
+            <p:cNvPr id="6" name="Straight Arrow Connector 5"/>
+            <p:cNvCxnSpPr/>
+            <p:nvPr/>
+          </p:nvCxnSpPr>
+          <p:spPr>
+            <a:xfrm>
+              <a:off x="5257800" y="838200"/>
+              <a:ext cx="0" cy="1600200"/>
+            </a:xfrm>
+            <a:prstGeom prst="straightConnector1">
+              <a:avLst/>
+            </a:prstGeom>
+            <a:ln w="25400">
+              <a:solidFill>
+                <a:schemeClr val="tx1"/>
+              </a:solidFill>
+              <a:tailEnd type="triangle"/>
+            </a:ln>
+          </p:spPr>
+          <p:style>
+            <a:lnRef idx="1">
+              <a:schemeClr val="accent1"/>
+            </a:lnRef>
+            <a:fillRef idx="0">
+              <a:schemeClr val="accent1"/>
+            </a:fillRef>
+            <a:effectRef idx="0">
+              <a:schemeClr val="accent1"/>
+            </a:effectRef>
+            <a:fontRef idx="minor">
+              <a:schemeClr val="tx1"/>
+            </a:fontRef>
+          </p:style>
+        </p:cxnSp>
+        <p:cxnSp>
+          <p:nvCxnSpPr>
+            <p:cNvPr id="8" name="Straight Arrow Connector 7"/>
+            <p:cNvCxnSpPr/>
+            <p:nvPr/>
+          </p:nvCxnSpPr>
+          <p:spPr>
+            <a:xfrm>
+              <a:off x="3962400" y="838200"/>
+              <a:ext cx="0" cy="1905000"/>
+            </a:xfrm>
+            <a:prstGeom prst="straightConnector1">
+              <a:avLst/>
+            </a:prstGeom>
+            <a:ln w="25400">
+              <a:solidFill>
+                <a:schemeClr val="tx1"/>
+              </a:solidFill>
+              <a:tailEnd type="triangle"/>
+            </a:ln>
+          </p:spPr>
+          <p:style>
+            <a:lnRef idx="1">
+              <a:schemeClr val="accent1"/>
+            </a:lnRef>
+            <a:fillRef idx="0">
+              <a:schemeClr val="accent1"/>
+            </a:fillRef>
+            <a:effectRef idx="0">
+              <a:schemeClr val="accent1"/>
+            </a:effectRef>
+            <a:fontRef idx="minor">
+              <a:schemeClr val="tx1"/>
+            </a:fontRef>
+          </p:style>
+        </p:cxnSp>
+        <p:cxnSp>
+          <p:nvCxnSpPr>
+            <p:cNvPr id="10" name="Straight Arrow Connector 9"/>
+            <p:cNvCxnSpPr/>
+            <p:nvPr/>
+          </p:nvCxnSpPr>
+          <p:spPr>
+            <a:xfrm>
+              <a:off x="2743200" y="1905000"/>
+              <a:ext cx="1143000" cy="0"/>
+            </a:xfrm>
+            <a:prstGeom prst="straightConnector1">
+              <a:avLst/>
+            </a:prstGeom>
+            <a:ln w="25400">
+              <a:solidFill>
+                <a:schemeClr val="tx1"/>
+              </a:solidFill>
+              <a:headEnd type="triangle"/>
+              <a:tailEnd type="triangle"/>
+            </a:ln>
+          </p:spPr>
+          <p:style>
+            <a:lnRef idx="1">
+              <a:schemeClr val="accent1"/>
+            </a:lnRef>
+            <a:fillRef idx="0">
+              <a:schemeClr val="accent1"/>
+            </a:fillRef>
+            <a:effectRef idx="0">
+              <a:schemeClr val="accent1"/>
+            </a:effectRef>
+            <a:fontRef idx="minor">
+              <a:schemeClr val="tx1"/>
+            </a:fontRef>
+          </p:style>
+        </p:cxnSp>
+        <p:cxnSp>
+          <p:nvCxnSpPr>
+            <p:cNvPr id="11" name="Straight Arrow Connector 10"/>
+            <p:cNvCxnSpPr/>
+            <p:nvPr/>
+          </p:nvCxnSpPr>
+          <p:spPr>
+            <a:xfrm>
+              <a:off x="4038600" y="1905000"/>
+              <a:ext cx="1143000" cy="0"/>
+            </a:xfrm>
+            <a:prstGeom prst="straightConnector1">
+              <a:avLst/>
+            </a:prstGeom>
+            <a:ln w="25400">
+              <a:solidFill>
+                <a:schemeClr val="tx1"/>
+              </a:solidFill>
+              <a:headEnd type="triangle"/>
+              <a:tailEnd type="triangle"/>
+            </a:ln>
+          </p:spPr>
+          <p:style>
+            <a:lnRef idx="1">
+              <a:schemeClr val="accent1"/>
+            </a:lnRef>
+            <a:fillRef idx="0">
+              <a:schemeClr val="accent1"/>
+            </a:fillRef>
+            <a:effectRef idx="0">
+              <a:schemeClr val="accent1"/>
+            </a:effectRef>
+            <a:fontRef idx="minor">
+              <a:schemeClr val="tx1"/>
+            </a:fontRef>
+          </p:style>
+        </p:cxnSp>
+        <p:sp>
+          <p:nvSpPr>
+            <p:cNvPr id="12" name="Oval 11"/>
+            <p:cNvSpPr>
+              <a:spLocks noChangeAspect="1"/>
+            </p:cNvSpPr>
+            <p:nvPr/>
+          </p:nvSpPr>
+          <p:spPr>
+            <a:xfrm>
+              <a:off x="2430087" y="652548"/>
+              <a:ext cx="381000" cy="381000"/>
+            </a:xfrm>
+            <a:prstGeom prst="ellipse">
+              <a:avLst/>
+            </a:prstGeom>
+            <a:noFill/>
+            <a:ln>
+              <a:solidFill>
+                <a:srgbClr val="FF0000"/>
+              </a:solidFill>
+            </a:ln>
+          </p:spPr>
+          <p:style>
+            <a:lnRef idx="2">
+              <a:schemeClr val="accent1">
+                <a:shade val="50000"/>
+              </a:schemeClr>
+            </a:lnRef>
+            <a:fillRef idx="1">
+              <a:schemeClr val="accent1"/>
+            </a:fillRef>
+            <a:effectRef idx="0">
+              <a:schemeClr val="accent1"/>
+            </a:effectRef>
+            <a:fontRef idx="minor">
+              <a:schemeClr val="lt1"/>
+            </a:fontRef>
+          </p:style>
+          <p:txBody>
+            <a:bodyPr rtlCol="0" anchor="ctr"/>
+            <a:lstStyle/>
+            <a:p>
+              <a:pPr algn="ctr"/>
+              <a:endParaRPr lang="en-US"/>
+            </a:p>
+          </p:txBody>
+        </p:sp>
+        <p:sp>
+          <p:nvSpPr>
+            <p:cNvPr id="13" name="Oval 12"/>
+            <p:cNvSpPr>
+              <a:spLocks noChangeAspect="1"/>
+            </p:cNvSpPr>
+            <p:nvPr/>
+          </p:nvSpPr>
+          <p:spPr>
+            <a:xfrm>
+              <a:off x="3785061" y="660861"/>
+              <a:ext cx="381000" cy="381000"/>
+            </a:xfrm>
+            <a:prstGeom prst="ellipse">
+              <a:avLst/>
+            </a:prstGeom>
+            <a:noFill/>
+            <a:ln>
+              <a:solidFill>
+                <a:srgbClr val="FF0000"/>
+              </a:solidFill>
+            </a:ln>
+          </p:spPr>
+          <p:style>
+            <a:lnRef idx="2">
+              <a:schemeClr val="accent1">
+                <a:shade val="50000"/>
+              </a:schemeClr>
+            </a:lnRef>
+            <a:fillRef idx="1">
+              <a:schemeClr val="accent1"/>
+            </a:fillRef>
+            <a:effectRef idx="0">
+              <a:schemeClr val="accent1"/>
+            </a:effectRef>
+            <a:fontRef idx="minor">
+              <a:schemeClr val="lt1"/>
+            </a:fontRef>
+          </p:style>
+          <p:txBody>
+            <a:bodyPr rtlCol="0" anchor="ctr"/>
+            <a:lstStyle/>
+            <a:p>
+              <a:pPr algn="ctr"/>
+              <a:endParaRPr lang="en-US"/>
+            </a:p>
+          </p:txBody>
+        </p:sp>
+        <p:sp>
+          <p:nvSpPr>
+            <p:cNvPr id="14" name="Oval 13"/>
+            <p:cNvSpPr>
+              <a:spLocks noChangeAspect="1"/>
+            </p:cNvSpPr>
+            <p:nvPr/>
+          </p:nvSpPr>
+          <p:spPr>
+            <a:xfrm>
+              <a:off x="5080461" y="660861"/>
+              <a:ext cx="381000" cy="381000"/>
+            </a:xfrm>
+            <a:prstGeom prst="ellipse">
+              <a:avLst/>
+            </a:prstGeom>
+            <a:noFill/>
+            <a:ln>
+              <a:solidFill>
+                <a:srgbClr val="FF0000"/>
+              </a:solidFill>
+            </a:ln>
+          </p:spPr>
+          <p:style>
+            <a:lnRef idx="2">
+              <a:schemeClr val="accent1">
+                <a:shade val="50000"/>
+              </a:schemeClr>
+            </a:lnRef>
+            <a:fillRef idx="1">
+              <a:schemeClr val="accent1"/>
+            </a:fillRef>
+            <a:effectRef idx="0">
+              <a:schemeClr val="accent1"/>
+            </a:effectRef>
+            <a:fontRef idx="minor">
+              <a:schemeClr val="lt1"/>
+            </a:fontRef>
+          </p:style>
+          <p:txBody>
+            <a:bodyPr rtlCol="0" anchor="ctr"/>
+            <a:lstStyle/>
+            <a:p>
+              <a:pPr algn="ctr"/>
+              <a:endParaRPr lang="en-US"/>
+            </a:p>
+          </p:txBody>
+        </p:sp>
+        <p:sp>
+          <p:nvSpPr>
+            <p:cNvPr id="15" name="TextBox 14"/>
+            <p:cNvSpPr txBox="1"/>
+            <p:nvPr/>
+          </p:nvSpPr>
+          <p:spPr>
+            <a:xfrm>
+              <a:off x="2362200" y="0"/>
+              <a:ext cx="533400" cy="369332"/>
+            </a:xfrm>
+            <a:prstGeom prst="rect">
+              <a:avLst/>
+            </a:prstGeom>
+            <a:noFill/>
+          </p:spPr>
+          <p:txBody>
+            <a:bodyPr wrap="square" rtlCol="0">
+              <a:spAutoFit/>
+            </a:bodyPr>
+            <a:lstStyle/>
+            <a:p>
+              <a:r>
+                <a:rPr lang="en-US" dirty="0" smtClean="0"/>
+                <a:t>N1</a:t>
+              </a:r>
+              <a:endParaRPr lang="en-US" dirty="0"/>
+            </a:p>
+          </p:txBody>
+        </p:sp>
+        <p:sp>
+          <p:nvSpPr>
+            <p:cNvPr id="16" name="TextBox 15"/>
+            <p:cNvSpPr txBox="1"/>
+            <p:nvPr/>
+          </p:nvSpPr>
+          <p:spPr>
+            <a:xfrm>
+              <a:off x="3733800" y="0"/>
+              <a:ext cx="533400" cy="369332"/>
+            </a:xfrm>
+            <a:prstGeom prst="rect">
+              <a:avLst/>
+            </a:prstGeom>
+            <a:noFill/>
+          </p:spPr>
+          <p:txBody>
+            <a:bodyPr wrap="square" rtlCol="0">
+              <a:spAutoFit/>
+            </a:bodyPr>
+            <a:lstStyle/>
+            <a:p>
+              <a:r>
+                <a:rPr lang="en-US" dirty="0" smtClean="0"/>
+                <a:t>N2</a:t>
+              </a:r>
+              <a:endParaRPr lang="en-US" dirty="0"/>
+            </a:p>
+          </p:txBody>
+        </p:sp>
+        <p:sp>
+          <p:nvSpPr>
+            <p:cNvPr id="17" name="TextBox 16"/>
+            <p:cNvSpPr txBox="1"/>
+            <p:nvPr/>
+          </p:nvSpPr>
+          <p:spPr>
+            <a:xfrm>
+              <a:off x="5029200" y="0"/>
+              <a:ext cx="533400" cy="369332"/>
+            </a:xfrm>
+            <a:prstGeom prst="rect">
+              <a:avLst/>
+            </a:prstGeom>
+            <a:noFill/>
+          </p:spPr>
+          <p:txBody>
+            <a:bodyPr wrap="square" rtlCol="0">
+              <a:spAutoFit/>
+            </a:bodyPr>
+            <a:lstStyle/>
+            <a:p>
+              <a:r>
+                <a:rPr lang="en-US" dirty="0" smtClean="0"/>
+                <a:t>N3</a:t>
+              </a:r>
+              <a:endParaRPr lang="en-US" dirty="0"/>
+            </a:p>
+          </p:txBody>
+        </p:sp>
+        <p:sp>
+          <p:nvSpPr>
+            <p:cNvPr id="18" name="TextBox 17"/>
+            <p:cNvSpPr txBox="1"/>
+            <p:nvPr/>
+          </p:nvSpPr>
+          <p:spPr>
+            <a:xfrm>
+              <a:off x="2209800" y="2971800"/>
+              <a:ext cx="533400" cy="369332"/>
+            </a:xfrm>
+            <a:prstGeom prst="rect">
+              <a:avLst/>
+            </a:prstGeom>
+            <a:noFill/>
+          </p:spPr>
+          <p:txBody>
+            <a:bodyPr wrap="square" rtlCol="0">
+              <a:spAutoFit/>
+            </a:bodyPr>
+            <a:lstStyle/>
+            <a:p>
+              <a:r>
+                <a:rPr lang="en-US" dirty="0" smtClean="0"/>
+                <a:t>f1</a:t>
+              </a:r>
+              <a:endParaRPr lang="en-US" dirty="0"/>
+            </a:p>
+          </p:txBody>
+        </p:sp>
+        <p:sp>
+          <p:nvSpPr>
+            <p:cNvPr id="19" name="TextBox 18"/>
+            <p:cNvSpPr txBox="1"/>
+            <p:nvPr/>
+          </p:nvSpPr>
+          <p:spPr>
+            <a:xfrm>
+              <a:off x="5105400" y="2590800"/>
+              <a:ext cx="533400" cy="369332"/>
+            </a:xfrm>
+            <a:prstGeom prst="rect">
+              <a:avLst/>
+            </a:prstGeom>
+            <a:noFill/>
+          </p:spPr>
+          <p:txBody>
+            <a:bodyPr wrap="square" rtlCol="0">
+              <a:spAutoFit/>
+            </a:bodyPr>
+            <a:lstStyle/>
+            <a:p>
+              <a:r>
+                <a:rPr lang="en-US" dirty="0" smtClean="0"/>
+                <a:t>f3</a:t>
+              </a:r>
+              <a:endParaRPr lang="en-US" dirty="0"/>
+            </a:p>
+          </p:txBody>
+        </p:sp>
+        <p:sp>
+          <p:nvSpPr>
+            <p:cNvPr id="20" name="TextBox 19"/>
+            <p:cNvSpPr txBox="1"/>
+            <p:nvPr/>
+          </p:nvSpPr>
+          <p:spPr>
+            <a:xfrm>
+              <a:off x="3810000" y="2895600"/>
+              <a:ext cx="533400" cy="369332"/>
+            </a:xfrm>
+            <a:prstGeom prst="rect">
+              <a:avLst/>
+            </a:prstGeom>
+            <a:noFill/>
+          </p:spPr>
+          <p:txBody>
+            <a:bodyPr wrap="square" rtlCol="0">
+              <a:spAutoFit/>
+            </a:bodyPr>
+            <a:lstStyle/>
+            <a:p>
+              <a:r>
+                <a:rPr lang="en-US" dirty="0" smtClean="0"/>
+                <a:t>f2</a:t>
+              </a:r>
+              <a:endParaRPr lang="en-US" dirty="0"/>
+            </a:p>
+          </p:txBody>
+        </p:sp>
+        <p:sp>
+          <p:nvSpPr>
+            <p:cNvPr id="26" name="TextBox 25"/>
+            <p:cNvSpPr txBox="1"/>
+            <p:nvPr/>
+          </p:nvSpPr>
+          <p:spPr>
+            <a:xfrm>
+              <a:off x="3276600" y="1524000"/>
+              <a:ext cx="609600" cy="369332"/>
+            </a:xfrm>
+            <a:prstGeom prst="rect">
+              <a:avLst/>
+            </a:prstGeom>
+            <a:noFill/>
+          </p:spPr>
+          <p:txBody>
+            <a:bodyPr wrap="square" rtlCol="0">
+              <a:spAutoFit/>
+            </a:bodyPr>
+            <a:lstStyle/>
+            <a:p>
+              <a:r>
+                <a:rPr lang="en-US" dirty="0" smtClean="0"/>
+                <a:t>el12</a:t>
+              </a:r>
+              <a:endParaRPr lang="en-US" dirty="0"/>
+            </a:p>
+          </p:txBody>
+        </p:sp>
+        <p:sp>
+          <p:nvSpPr>
+            <p:cNvPr id="27" name="TextBox 26"/>
+            <p:cNvSpPr txBox="1"/>
+            <p:nvPr/>
+          </p:nvSpPr>
+          <p:spPr>
+            <a:xfrm>
+              <a:off x="4038600" y="1524000"/>
+              <a:ext cx="609600" cy="369332"/>
+            </a:xfrm>
+            <a:prstGeom prst="rect">
+              <a:avLst/>
+            </a:prstGeom>
+            <a:noFill/>
+          </p:spPr>
+          <p:txBody>
+            <a:bodyPr wrap="square" rtlCol="0">
+              <a:spAutoFit/>
+            </a:bodyPr>
+            <a:lstStyle/>
+            <a:p>
+              <a:r>
+                <a:rPr lang="en-US" dirty="0" smtClean="0"/>
+                <a:t>el23</a:t>
+              </a:r>
+              <a:endParaRPr lang="en-US" dirty="0"/>
+            </a:p>
+          </p:txBody>
+        </p:sp>
+        <p:sp>
+          <p:nvSpPr>
+            <p:cNvPr id="39" name="TextBox 38"/>
+            <p:cNvSpPr txBox="1"/>
+            <p:nvPr/>
+          </p:nvSpPr>
+          <p:spPr>
+            <a:xfrm>
+              <a:off x="5791200" y="0"/>
+              <a:ext cx="533400" cy="369332"/>
+            </a:xfrm>
+            <a:prstGeom prst="rect">
+              <a:avLst/>
+            </a:prstGeom>
+            <a:noFill/>
+          </p:spPr>
+          <p:txBody>
+            <a:bodyPr wrap="square" rtlCol="0">
+              <a:spAutoFit/>
+            </a:bodyPr>
+            <a:lstStyle/>
+            <a:p>
+              <a:r>
+                <a:rPr lang="en-US" dirty="0" smtClean="0"/>
+                <a:t>N4</a:t>
+              </a:r>
+              <a:endParaRPr lang="en-US" dirty="0"/>
+            </a:p>
+          </p:txBody>
+        </p:sp>
+        <p:sp>
+          <p:nvSpPr>
+            <p:cNvPr id="41" name="Oval 40"/>
+            <p:cNvSpPr>
+              <a:spLocks noChangeAspect="1"/>
+            </p:cNvSpPr>
+            <p:nvPr/>
+          </p:nvSpPr>
+          <p:spPr>
+            <a:xfrm>
+              <a:off x="5867400" y="652548"/>
+              <a:ext cx="381000" cy="381000"/>
+            </a:xfrm>
+            <a:prstGeom prst="ellipse">
+              <a:avLst/>
+            </a:prstGeom>
+            <a:noFill/>
+            <a:ln>
+              <a:solidFill>
+                <a:srgbClr val="FF0000"/>
+              </a:solidFill>
+            </a:ln>
+          </p:spPr>
+          <p:style>
+            <a:lnRef idx="2">
+              <a:schemeClr val="accent1">
+                <a:shade val="50000"/>
+              </a:schemeClr>
+            </a:lnRef>
+            <a:fillRef idx="1">
+              <a:schemeClr val="accent1"/>
+            </a:fillRef>
+            <a:effectRef idx="0">
+              <a:schemeClr val="accent1"/>
+            </a:effectRef>
+            <a:fontRef idx="minor">
+              <a:schemeClr val="lt1"/>
+            </a:fontRef>
+          </p:style>
+          <p:txBody>
+            <a:bodyPr rtlCol="0" anchor="ctr"/>
+            <a:lstStyle/>
+            <a:p>
+              <a:pPr algn="ctr"/>
+              <a:endParaRPr lang="en-US"/>
+            </a:p>
+          </p:txBody>
+        </p:sp>
+        <p:sp>
+          <p:nvSpPr>
+            <p:cNvPr id="46" name="TextBox 45"/>
+            <p:cNvSpPr txBox="1"/>
+            <p:nvPr/>
+          </p:nvSpPr>
+          <p:spPr>
+            <a:xfrm>
+              <a:off x="5867400" y="2373868"/>
+              <a:ext cx="533400" cy="369332"/>
+            </a:xfrm>
+            <a:prstGeom prst="rect">
+              <a:avLst/>
+            </a:prstGeom>
+            <a:noFill/>
+          </p:spPr>
+          <p:txBody>
+            <a:bodyPr wrap="square" rtlCol="0">
+              <a:spAutoFit/>
+            </a:bodyPr>
+            <a:lstStyle/>
+            <a:p>
+              <a:r>
+                <a:rPr lang="en-US" dirty="0" smtClean="0"/>
+                <a:t>f4</a:t>
+              </a:r>
+              <a:endParaRPr lang="en-US" dirty="0"/>
+            </a:p>
+          </p:txBody>
+        </p:sp>
+        <p:cxnSp>
+          <p:nvCxnSpPr>
+            <p:cNvPr id="48" name="Straight Arrow Connector 47"/>
+            <p:cNvCxnSpPr/>
+            <p:nvPr/>
+          </p:nvCxnSpPr>
+          <p:spPr>
+            <a:xfrm>
+              <a:off x="5334000" y="1905000"/>
+              <a:ext cx="609600" cy="0"/>
+            </a:xfrm>
+            <a:prstGeom prst="straightConnector1">
+              <a:avLst/>
+            </a:prstGeom>
+            <a:ln w="25400">
+              <a:solidFill>
+                <a:schemeClr val="tx1"/>
+              </a:solidFill>
+              <a:headEnd type="triangle"/>
+              <a:tailEnd type="triangle"/>
+            </a:ln>
+          </p:spPr>
+          <p:style>
+            <a:lnRef idx="1">
+              <a:schemeClr val="accent1"/>
+            </a:lnRef>
+            <a:fillRef idx="0">
+              <a:schemeClr val="accent1"/>
+            </a:fillRef>
+            <a:effectRef idx="0">
+              <a:schemeClr val="accent1"/>
+            </a:effectRef>
+            <a:fontRef idx="minor">
+              <a:schemeClr val="tx1"/>
+            </a:fontRef>
+          </p:style>
+        </p:cxnSp>
+        <p:sp>
+          <p:nvSpPr>
+            <p:cNvPr id="50" name="TextBox 49"/>
+            <p:cNvSpPr txBox="1"/>
+            <p:nvPr/>
+          </p:nvSpPr>
+          <p:spPr>
+            <a:xfrm>
+              <a:off x="5334000" y="1524000"/>
+              <a:ext cx="609600" cy="369332"/>
+            </a:xfrm>
+            <a:prstGeom prst="rect">
+              <a:avLst/>
+            </a:prstGeom>
+            <a:noFill/>
+          </p:spPr>
+          <p:txBody>
+            <a:bodyPr wrap="square" rtlCol="0">
+              <a:spAutoFit/>
+            </a:bodyPr>
+            <a:lstStyle/>
+            <a:p>
+              <a:r>
+                <a:rPr lang="en-US" dirty="0" smtClean="0"/>
+                <a:t>el34</a:t>
+              </a:r>
+              <a:endParaRPr lang="en-US" dirty="0"/>
+            </a:p>
+          </p:txBody>
+        </p:sp>
+      </p:grpSp>
+    </p:spTree>
+  </p:cSld>
+  <p:clrMapOvr>
+    <a:masterClrMapping/>
+  </p:clrMapOvr>
+</p:sld>
+</file>
+
+<file path=ppt/slides/slide16.xml><?xml version="1.0" encoding="utf-8"?>
+<p:sld xmlns:a="http://schemas.openxmlformats.org/drawingml/2006/main" xmlns:r="http://schemas.openxmlformats.org/officeDocument/2006/relationships" xmlns:p="http://schemas.openxmlformats.org/presentationml/2006/main">
+  <p:cSld>
+    <p:spTree>
+      <p:nvGrpSpPr>
+        <p:cNvPr id="1" name=""/>
+        <p:cNvGrpSpPr/>
+        <p:nvPr/>
+      </p:nvGrpSpPr>
+      <p:grpSpPr>
+        <a:xfrm>
+          <a:off x="0" y="0"/>
+          <a:ext cx="0" cy="0"/>
+          <a:chOff x="0" y="0"/>
+          <a:chExt cx="0" cy="0"/>
+        </a:xfrm>
+      </p:grpSpPr>
+      <p:pic>
+        <p:nvPicPr>
+          <p:cNvPr id="2051" name="Picture 3"/>
+          <p:cNvPicPr>
+            <a:picLocks noChangeAspect="1" noChangeArrowheads="1"/>
+          </p:cNvPicPr>
+          <p:nvPr/>
+        </p:nvPicPr>
+        <p:blipFill>
+          <a:blip r:embed="rId2" cstate="print"/>
+          <a:srcRect/>
+          <a:stretch>
+            <a:fillRect/>
+          </a:stretch>
+        </p:blipFill>
+        <p:spPr bwMode="auto">
+          <a:xfrm>
+            <a:off x="948238" y="1524000"/>
+            <a:ext cx="6960523" cy="3657600"/>
+          </a:xfrm>
+          <a:prstGeom prst="rect">
+            <a:avLst/>
+          </a:prstGeom>
+          <a:noFill/>
+          <a:ln w="9525">
+            <a:noFill/>
+            <a:miter lim="800000"/>
+            <a:headEnd/>
+            <a:tailEnd/>
+          </a:ln>
+          <a:effectLst/>
+        </p:spPr>
+      </p:pic>
+    </p:spTree>
+  </p:cSld>
+  <p:clrMapOvr>
+    <a:masterClrMapping/>
+  </p:clrMapOvr>
+</p:sld>
+</file>
+
+<file path=ppt/slides/slide17.xml><?xml version="1.0" encoding="utf-8"?>
+<p:sld xmlns:a="http://schemas.openxmlformats.org/drawingml/2006/main" xmlns:r="http://schemas.openxmlformats.org/officeDocument/2006/relationships" xmlns:p="http://schemas.openxmlformats.org/presentationml/2006/main">
+  <p:cSld>
+    <p:spTree>
+      <p:nvGrpSpPr>
+        <p:cNvPr id="1" name=""/>
+        <p:cNvGrpSpPr/>
+        <p:nvPr/>
+      </p:nvGrpSpPr>
+      <p:grpSpPr>
+        <a:xfrm>
+          <a:off x="0" y="0"/>
+          <a:ext cx="0" cy="0"/>
+          <a:chOff x="0" y="0"/>
+          <a:chExt cx="0" cy="0"/>
+        </a:xfrm>
+      </p:grpSpPr>
+      <p:pic>
+        <p:nvPicPr>
+          <p:cNvPr id="1026" name="Picture 2" descr="C:\Users\Jack\Desktop\Noname.png"/>
+          <p:cNvPicPr>
+            <a:picLocks noChangeAspect="1" noChangeArrowheads="1"/>
+          </p:cNvPicPr>
+          <p:nvPr/>
+        </p:nvPicPr>
+        <p:blipFill>
+          <a:blip r:embed="rId2" cstate="print"/>
+          <a:srcRect/>
+          <a:stretch>
+            <a:fillRect/>
+          </a:stretch>
+        </p:blipFill>
+        <p:spPr bwMode="auto">
+          <a:xfrm>
+            <a:off x="-152400" y="2600325"/>
+            <a:ext cx="9448800" cy="1657350"/>
+          </a:xfrm>
+          <a:prstGeom prst="rect">
+            <a:avLst/>
+          </a:prstGeom>
+          <a:noFill/>
+        </p:spPr>
+      </p:pic>
     </p:spTree>
   </p:cSld>
   <p:clrMapOvr>

</xml_diff>